<commit_message>
added code diagram to presentation
</commit_message>
<xml_diff>
--- a/Fridge Friend.pptx
+++ b/Fridge Friend.pptx
@@ -17,6 +17,7 @@
     <p:sldId id="264" r:id="rId12"/>
     <p:sldId id="265" r:id="rId13"/>
     <p:sldId id="266" r:id="rId14"/>
+    <p:sldId id="267" r:id="rId15"/>
   </p:sldIdLst>
   <p:sldSz cx="12192000" cy="6858000"/>
   <p:notesSz cx="7772400" cy="10058400"/>
@@ -3004,7 +3005,7 @@
         <p:spPr>
           <a:xfrm>
             <a:off x="0" y="758880"/>
-            <a:ext cx="3443040" cy="5330160"/>
+            <a:ext cx="3442680" cy="5329800"/>
           </a:xfrm>
           <a:prstGeom prst="rect">
             <a:avLst/>
@@ -3040,7 +3041,7 @@
         <p:spPr>
           <a:xfrm>
             <a:off x="11815920" y="758880"/>
-            <a:ext cx="383400" cy="5330160"/>
+            <a:ext cx="383040" cy="5329800"/>
           </a:xfrm>
           <a:prstGeom prst="rect">
             <a:avLst/>
@@ -3078,7 +3079,7 @@
         <p:spPr>
           <a:xfrm>
             <a:off x="0" y="762120"/>
-            <a:ext cx="9140760" cy="5333400"/>
+            <a:ext cx="9140400" cy="5333040"/>
           </a:xfrm>
           <a:prstGeom prst="rect">
             <a:avLst/>
@@ -3114,7 +3115,7 @@
         <p:spPr>
           <a:xfrm>
             <a:off x="9270360" y="762120"/>
-            <a:ext cx="2924640" cy="5333400"/>
+            <a:ext cx="2924280" cy="5333040"/>
           </a:xfrm>
           <a:prstGeom prst="rect">
             <a:avLst/>
@@ -3155,8 +3156,8 @@
         </p:nvSpPr>
         <p:spPr>
           <a:xfrm>
-            <a:off x="253080" y="1123920"/>
-            <a:ext cx="2946600" cy="4600440"/>
+            <a:off x="609480" y="273600"/>
+            <a:ext cx="10972080" cy="1144440"/>
           </a:xfrm>
           <a:prstGeom prst="rect">
             <a:avLst/>
@@ -3193,7 +3194,7 @@
         <p:spPr>
           <a:xfrm>
             <a:off x="609480" y="1604520"/>
-            <a:ext cx="10972440" cy="3977280"/>
+            <a:ext cx="10972080" cy="3976920"/>
           </a:xfrm>
           <a:prstGeom prst="rect">
             <a:avLst/>
@@ -3211,7 +3212,7 @@
               <a:buChar char=""/>
             </a:pPr>
             <a:r>
-              <a:rPr b="0" lang="en-US" sz="3200" spc="-1" strike="noStrike">
+              <a:rPr b="0" lang="en-US" sz="1800" spc="-1" strike="noStrike">
                 <a:solidFill>
                   <a:srgbClr val="000000"/>
                 </a:solidFill>
@@ -3224,7 +3225,7 @@
               </a:rPr>
               <a:t>Click to edit the outline text format</a:t>
             </a:r>
-            <a:endParaRPr b="0" lang="en-US" sz="3200" spc="-1" strike="noStrike">
+            <a:endParaRPr b="0" lang="en-US" sz="1800" spc="-1" strike="noStrike">
               <a:solidFill>
                 <a:srgbClr val="000000"/>
               </a:solidFill>
@@ -3246,7 +3247,7 @@
               <a:buChar char=""/>
             </a:pPr>
             <a:r>
-              <a:rPr b="0" lang="en-US" sz="2800" spc="-1" strike="noStrike">
+              <a:rPr b="0" lang="en-US" sz="1800" spc="-1" strike="noStrike">
                 <a:solidFill>
                   <a:srgbClr val="000000"/>
                 </a:solidFill>
@@ -3259,7 +3260,7 @@
               </a:rPr>
               <a:t>Second Outline Level</a:t>
             </a:r>
-            <a:endParaRPr b="0" lang="en-US" sz="2800" spc="-1" strike="noStrike">
+            <a:endParaRPr b="0" lang="en-US" sz="1800" spc="-1" strike="noStrike">
               <a:solidFill>
                 <a:srgbClr val="000000"/>
               </a:solidFill>
@@ -3281,7 +3282,7 @@
               <a:buChar char=""/>
             </a:pPr>
             <a:r>
-              <a:rPr b="0" lang="en-US" sz="2400" spc="-1" strike="noStrike">
+              <a:rPr b="0" lang="en-US" sz="1800" spc="-1" strike="noStrike">
                 <a:solidFill>
                   <a:srgbClr val="000000"/>
                 </a:solidFill>
@@ -3294,7 +3295,7 @@
               </a:rPr>
               <a:t>Third Outline Level</a:t>
             </a:r>
-            <a:endParaRPr b="0" lang="en-US" sz="2400" spc="-1" strike="noStrike">
+            <a:endParaRPr b="0" lang="en-US" sz="1800" spc="-1" strike="noStrike">
               <a:solidFill>
                 <a:srgbClr val="000000"/>
               </a:solidFill>
@@ -3316,7 +3317,7 @@
               <a:buChar char=""/>
             </a:pPr>
             <a:r>
-              <a:rPr b="0" lang="en-US" sz="2000" spc="-1" strike="noStrike">
+              <a:rPr b="0" lang="en-US" sz="1800" spc="-1" strike="noStrike">
                 <a:solidFill>
                   <a:srgbClr val="000000"/>
                 </a:solidFill>
@@ -3329,7 +3330,7 @@
               </a:rPr>
               <a:t>Fourth Outline Level</a:t>
             </a:r>
-            <a:endParaRPr b="0" lang="en-US" sz="2000" spc="-1" strike="noStrike">
+            <a:endParaRPr b="0" lang="en-US" sz="1800" spc="-1" strike="noStrike">
               <a:solidFill>
                 <a:srgbClr val="000000"/>
               </a:solidFill>
@@ -3351,7 +3352,7 @@
               <a:buChar char=""/>
             </a:pPr>
             <a:r>
-              <a:rPr b="0" lang="en-US" sz="2000" spc="-1" strike="noStrike">
+              <a:rPr b="0" lang="en-US" sz="1800" spc="-1" strike="noStrike">
                 <a:solidFill>
                   <a:srgbClr val="000000"/>
                 </a:solidFill>
@@ -3364,7 +3365,7 @@
               </a:rPr>
               <a:t>Fifth Outline Level</a:t>
             </a:r>
-            <a:endParaRPr b="0" lang="en-US" sz="2000" spc="-1" strike="noStrike">
+            <a:endParaRPr b="0" lang="en-US" sz="1800" spc="-1" strike="noStrike">
               <a:solidFill>
                 <a:srgbClr val="000000"/>
               </a:solidFill>
@@ -3386,7 +3387,7 @@
               <a:buChar char=""/>
             </a:pPr>
             <a:r>
-              <a:rPr b="0" lang="en-US" sz="2000" spc="-1" strike="noStrike">
+              <a:rPr b="0" lang="en-US" sz="1800" spc="-1" strike="noStrike">
                 <a:solidFill>
                   <a:srgbClr val="000000"/>
                 </a:solidFill>
@@ -3399,7 +3400,7 @@
               </a:rPr>
               <a:t>Sixth Outline Level</a:t>
             </a:r>
-            <a:endParaRPr b="0" lang="en-US" sz="2000" spc="-1" strike="noStrike">
+            <a:endParaRPr b="0" lang="en-US" sz="1800" spc="-1" strike="noStrike">
               <a:solidFill>
                 <a:srgbClr val="000000"/>
               </a:solidFill>
@@ -3421,7 +3422,7 @@
               <a:buChar char=""/>
             </a:pPr>
             <a:r>
-              <a:rPr b="0" lang="en-US" sz="2000" spc="-1" strike="noStrike">
+              <a:rPr b="0" lang="en-US" sz="1800" spc="-1" strike="noStrike">
                 <a:solidFill>
                   <a:srgbClr val="000000"/>
                 </a:solidFill>
@@ -3434,7 +3435,7 @@
               </a:rPr>
               <a:t>Seventh Outline Level</a:t>
             </a:r>
-            <a:endParaRPr b="0" lang="en-US" sz="2000" spc="-1" strike="noStrike">
+            <a:endParaRPr b="0" lang="en-US" sz="1800" spc="-1" strike="noStrike">
               <a:solidFill>
                 <a:srgbClr val="000000"/>
               </a:solidFill>
@@ -3501,7 +3502,7 @@
         <p:spPr>
           <a:xfrm>
             <a:off x="0" y="758880"/>
-            <a:ext cx="3443040" cy="5330160"/>
+            <a:ext cx="3442680" cy="5329800"/>
           </a:xfrm>
           <a:prstGeom prst="rect">
             <a:avLst/>
@@ -3537,7 +3538,7 @@
         <p:spPr>
           <a:xfrm>
             <a:off x="11815920" y="758880"/>
-            <a:ext cx="383400" cy="5330160"/>
+            <a:ext cx="383040" cy="5329800"/>
           </a:xfrm>
           <a:prstGeom prst="rect">
             <a:avLst/>
@@ -3931,7 +3932,7 @@
         <p:spPr>
           <a:xfrm>
             <a:off x="1069920" y="1298520"/>
-            <a:ext cx="7314480" cy="3254400"/>
+            <a:ext cx="7314120" cy="3254040"/>
           </a:xfrm>
           <a:prstGeom prst="rect">
             <a:avLst/>
@@ -3956,7 +3957,7 @@
               </a:lnSpc>
             </a:pPr>
             <a:r>
-              <a:rPr b="0" lang="en-US" sz="5900" spc="-94" strike="noStrike">
+              <a:rPr b="0" lang="en-US" sz="5900" spc="-92" strike="noStrike">
                 <a:solidFill>
                   <a:srgbClr val="ffffff"/>
                 </a:solidFill>
@@ -3966,6 +3967,7 @@
                   </a:solidFill>
                 </a:uFill>
                 <a:latin typeface="Corbel"/>
+                <a:ea typeface="DejaVu Sans"/>
               </a:rPr>
               <a:t>Fridge Friend</a:t>
             </a:r>
@@ -3992,7 +3994,7 @@
         <p:spPr>
           <a:xfrm>
             <a:off x="1100160" y="4670280"/>
-            <a:ext cx="7314480" cy="913680"/>
+            <a:ext cx="7314120" cy="913320"/>
           </a:xfrm>
           <a:prstGeom prst="rect">
             <a:avLst/>
@@ -4027,6 +4029,7 @@
                   </a:solidFill>
                 </a:uFill>
                 <a:latin typeface="Corbel"/>
+                <a:ea typeface="DejaVu Sans"/>
               </a:rPr>
               <a:t>John Merrill | Sam Chambers | Alex Nevers</a:t>
             </a:r>
@@ -4057,7 +4060,7 @@
         <p:spPr>
           <a:xfrm>
             <a:off x="2468880" y="1316880"/>
-            <a:ext cx="2103120" cy="2157840"/>
+            <a:ext cx="2102760" cy="2157480"/>
           </a:xfrm>
           <a:prstGeom prst="rect">
             <a:avLst/>
@@ -4118,14 +4121,14 @@
       </p:grpSpPr>
       <p:sp>
         <p:nvSpPr>
-          <p:cNvPr id="97" name="CustomShape 1"/>
+          <p:cNvPr id="115" name="CustomShape 1"/>
           <p:cNvSpPr/>
           <p:nvPr/>
         </p:nvSpPr>
         <p:spPr>
           <a:xfrm>
-            <a:off x="253080" y="1123920"/>
-            <a:ext cx="2946600" cy="4600440"/>
+            <a:off x="239760" y="1123920"/>
+            <a:ext cx="2946240" cy="4600080"/>
           </a:xfrm>
           <a:prstGeom prst="rect">
             <a:avLst/>
@@ -4145,7 +4148,7 @@
           <a:bodyPr lIns="90000" rIns="90000" tIns="45000" bIns="45000" anchor="ctr"/>
           <a:p>
             <a:r>
-              <a:rPr b="0" lang="en-US" sz="3600" spc="-55" strike="noStrike">
+              <a:rPr b="0" lang="en-US" sz="3600" spc="-52" strike="noStrike">
                 <a:solidFill>
                   <a:srgbClr val="ffffff"/>
                 </a:solidFill>
@@ -4155,6 +4158,7 @@
                   </a:solidFill>
                 </a:uFill>
                 <a:latin typeface="Corbel"/>
+                <a:ea typeface="DejaVu Sans"/>
               </a:rPr>
               <a:t>Member Tasks:</a:t>
             </a:r>
@@ -4190,7 +4194,7 @@
               </a:lnSpc>
             </a:pPr>
             <a:r>
-              <a:rPr b="0" lang="en-US" sz="3600" spc="-55" strike="noStrike">
+              <a:rPr b="0" lang="en-US" sz="3600" spc="-52" strike="noStrike">
                 <a:solidFill>
                   <a:srgbClr val="ffffff"/>
                 </a:solidFill>
@@ -4200,8 +4204,9 @@
                   </a:solidFill>
                 </a:uFill>
                 <a:latin typeface="Corbel"/>
-              </a:rPr>
-              <a:t>Sam</a:t>
+                <a:ea typeface="DejaVu Sans"/>
+              </a:rPr>
+              <a:t>Alex</a:t>
             </a:r>
             <a:endParaRPr b="0" lang="en-US" sz="1800" spc="-1" strike="noStrike">
               <a:solidFill>
@@ -4219,14 +4224,14 @@
       </p:sp>
       <p:sp>
         <p:nvSpPr>
-          <p:cNvPr id="98" name="CustomShape 2"/>
+          <p:cNvPr id="116" name="CustomShape 2"/>
           <p:cNvSpPr/>
           <p:nvPr/>
         </p:nvSpPr>
         <p:spPr>
           <a:xfrm>
             <a:off x="3869280" y="864000"/>
-            <a:ext cx="7314480" cy="5119920"/>
+            <a:ext cx="7314120" cy="5119560"/>
           </a:xfrm>
           <a:prstGeom prst="rect">
             <a:avLst/>
@@ -4245,7 +4250,7 @@
         <p:txBody>
           <a:bodyPr lIns="90000" rIns="90000" tIns="45000" bIns="45000" anchor="ctr"/>
           <a:p>
-            <a:pPr marL="182880" indent="-182160">
+            <a:pPr marL="182880" indent="-181800">
               <a:lnSpc>
                 <a:spcPct val="150000"/>
               </a:lnSpc>
@@ -4266,8 +4271,9 @@
                   </a:solidFill>
                 </a:uFill>
                 <a:latin typeface="Corbel"/>
-              </a:rPr>
-              <a:t>Design a user interface</a:t>
+                <a:ea typeface="DejaVu Sans"/>
+              </a:rPr>
+              <a:t>Set up a SQL database to store and access scanned items</a:t>
             </a:r>
             <a:endParaRPr b="0" lang="en-US" sz="1800" spc="-1" strike="noStrike">
               <a:solidFill>
@@ -4282,7 +4288,7 @@
             </a:endParaRPr>
           </a:p>
           <a:p>
-            <a:pPr marL="182880" indent="-182160">
+            <a:pPr marL="182880" indent="-181800">
               <a:lnSpc>
                 <a:spcPct val="150000"/>
               </a:lnSpc>
@@ -4303,8 +4309,9 @@
                   </a:solidFill>
                 </a:uFill>
                 <a:latin typeface="Corbel"/>
-              </a:rPr>
-              <a:t>Set up interaction with the camera app to retrieve barcode images</a:t>
+                <a:ea typeface="DejaVu Sans"/>
+              </a:rPr>
+              <a:t>Create an API structure (directory organization, class hierarchies, etc.)</a:t>
             </a:r>
             <a:endParaRPr b="0" lang="en-US" sz="1800" spc="-1" strike="noStrike">
               <a:solidFill>
@@ -4319,7 +4326,7 @@
             </a:endParaRPr>
           </a:p>
           <a:p>
-            <a:pPr marL="182880" indent="-182160">
+            <a:pPr marL="182880" indent="-181800">
               <a:lnSpc>
                 <a:spcPct val="150000"/>
               </a:lnSpc>
@@ -4340,6 +4347,7 @@
                   </a:solidFill>
                 </a:uFill>
                 <a:latin typeface="Corbel"/>
+                <a:ea typeface="DejaVu Sans"/>
               </a:rPr>
               <a:t>Class Assignments:</a:t>
             </a:r>
@@ -4356,7 +4364,7 @@
             </a:endParaRPr>
           </a:p>
           <a:p>
-            <a:pPr lvl="1" marL="685800" indent="-182160">
+            <a:pPr lvl="1" marL="685800" indent="-181800">
               <a:lnSpc>
                 <a:spcPct val="150000"/>
               </a:lnSpc>
@@ -4377,8 +4385,9 @@
                   </a:solidFill>
                 </a:uFill>
                 <a:latin typeface="Corbel"/>
-              </a:rPr>
-              <a:t>ItemType</a:t>
+                <a:ea typeface="DejaVu Sans"/>
+              </a:rPr>
+              <a:t>DBHelper</a:t>
             </a:r>
             <a:endParaRPr b="0" lang="en-US" sz="1800" spc="-1" strike="noStrike">
               <a:solidFill>
@@ -4393,7 +4402,7 @@
             </a:endParaRPr>
           </a:p>
           <a:p>
-            <a:pPr lvl="1" marL="685800" indent="-182160">
+            <a:pPr lvl="1" marL="685800" indent="-181800">
               <a:lnSpc>
                 <a:spcPct val="150000"/>
               </a:lnSpc>
@@ -4414,82 +4423,9 @@
                   </a:solidFill>
                 </a:uFill>
                 <a:latin typeface="Corbel"/>
-              </a:rPr>
-              <a:t>MainActivity</a:t>
-            </a:r>
-            <a:endParaRPr b="0" lang="en-US" sz="1800" spc="-1" strike="noStrike">
-              <a:solidFill>
-                <a:srgbClr val="000000"/>
-              </a:solidFill>
-              <a:uFill>
-                <a:solidFill>
-                  <a:srgbClr val="ffffff"/>
-                </a:solidFill>
-              </a:uFill>
-              <a:latin typeface="Arial"/>
-            </a:endParaRPr>
-          </a:p>
-          <a:p>
-            <a:pPr lvl="1" marL="685800" indent="-182160">
-              <a:lnSpc>
-                <a:spcPct val="150000"/>
-              </a:lnSpc>
-              <a:buClr>
-                <a:srgbClr val="40bad2"/>
-              </a:buClr>
-              <a:buFont typeface="Wingdings 2" charset="2"/>
-              <a:buChar char=""/>
-            </a:pPr>
-            <a:r>
-              <a:rPr b="0" lang="en-US" sz="1800" spc="-1" strike="noStrike">
-                <a:solidFill>
-                  <a:srgbClr val="595959"/>
-                </a:solidFill>
-                <a:uFill>
-                  <a:solidFill>
-                    <a:srgbClr val="ffffff"/>
-                  </a:solidFill>
-                </a:uFill>
-                <a:latin typeface="Corbel"/>
+                <a:ea typeface="DejaVu Sans"/>
               </a:rPr>
               <a:t>ResultsActivity</a:t>
-            </a:r>
-            <a:endParaRPr b="0" lang="en-US" sz="1800" spc="-1" strike="noStrike">
-              <a:solidFill>
-                <a:srgbClr val="000000"/>
-              </a:solidFill>
-              <a:uFill>
-                <a:solidFill>
-                  <a:srgbClr val="ffffff"/>
-                </a:solidFill>
-              </a:uFill>
-              <a:latin typeface="Arial"/>
-            </a:endParaRPr>
-          </a:p>
-          <a:p>
-            <a:pPr lvl="1" marL="685800" indent="-182160">
-              <a:lnSpc>
-                <a:spcPct val="150000"/>
-              </a:lnSpc>
-              <a:buClr>
-                <a:srgbClr val="40bad2"/>
-              </a:buClr>
-              <a:buFont typeface="Wingdings 2" charset="2"/>
-              <a:buChar char=""/>
-            </a:pPr>
-            <a:r>
-              <a:rPr b="0" lang="en-US" sz="1800" spc="-1" strike="noStrike">
-                <a:solidFill>
-                  <a:srgbClr val="595959"/>
-                </a:solidFill>
-                <a:uFill>
-                  <a:solidFill>
-                    <a:srgbClr val="ffffff"/>
-                  </a:solidFill>
-                </a:uFill>
-                <a:latin typeface="Corbel"/>
-              </a:rPr>
-              <a:t>UI Layouts</a:t>
             </a:r>
             <a:endParaRPr b="0" lang="en-US" sz="1800" spc="-1" strike="noStrike">
               <a:solidFill>
@@ -4556,14 +4492,14 @@
       </p:grpSpPr>
       <p:sp>
         <p:nvSpPr>
-          <p:cNvPr id="99" name="CustomShape 1"/>
+          <p:cNvPr id="117" name="CustomShape 1"/>
           <p:cNvSpPr/>
           <p:nvPr/>
         </p:nvSpPr>
         <p:spPr>
           <a:xfrm>
             <a:off x="253080" y="1123920"/>
-            <a:ext cx="2946600" cy="4600440"/>
+            <a:ext cx="2946240" cy="4600080"/>
           </a:xfrm>
           <a:prstGeom prst="rect">
             <a:avLst/>
@@ -4582,13 +4518,54 @@
         <p:txBody>
           <a:bodyPr lIns="90000" rIns="90000" tIns="45000" bIns="45000" anchor="ctr"/>
           <a:p>
+            <a:r>
+              <a:rPr b="0" lang="en-US" sz="3600" spc="-52" strike="noStrike">
+                <a:solidFill>
+                  <a:srgbClr val="ffffff"/>
+                </a:solidFill>
+                <a:uFill>
+                  <a:solidFill>
+                    <a:srgbClr val="ffffff"/>
+                  </a:solidFill>
+                </a:uFill>
+                <a:latin typeface="Corbel"/>
+                <a:ea typeface="DejaVu Sans"/>
+              </a:rPr>
+              <a:t>Member Tasks:</a:t>
+            </a:r>
+            <a:endParaRPr b="0" lang="en-US" sz="1800" spc="-1" strike="noStrike">
+              <a:solidFill>
+                <a:srgbClr val="000000"/>
+              </a:solidFill>
+              <a:uFill>
+                <a:solidFill>
+                  <a:srgbClr val="ffffff"/>
+                </a:solidFill>
+              </a:uFill>
+              <a:latin typeface="Arial"/>
+            </a:endParaRPr>
+          </a:p>
+          <a:p>
+            <a:endParaRPr b="0" lang="en-US" sz="1800" spc="-1" strike="noStrike">
+              <a:solidFill>
+                <a:srgbClr val="000000"/>
+              </a:solidFill>
+              <a:uFill>
+                <a:solidFill>
+                  <a:srgbClr val="ffffff"/>
+                </a:solidFill>
+              </a:uFill>
+              <a:latin typeface="Arial"/>
+            </a:endParaRPr>
+          </a:p>
+          <a:p>
             <a:pPr>
               <a:lnSpc>
                 <a:spcPct val="90000"/>
               </a:lnSpc>
             </a:pPr>
             <a:r>
-              <a:rPr b="0" lang="en-US" sz="3600" spc="-55" strike="noStrike">
+              <a:rPr b="0" lang="en-US" sz="3600" spc="-52" strike="noStrike">
                 <a:solidFill>
                   <a:srgbClr val="ffffff"/>
                 </a:solidFill>
@@ -4598,8 +4575,9 @@
                   </a:solidFill>
                 </a:uFill>
                 <a:latin typeface="Corbel"/>
-              </a:rPr>
-              <a:t>Conclusion</a:t>
+                <a:ea typeface="DejaVu Sans"/>
+              </a:rPr>
+              <a:t>Sam</a:t>
             </a:r>
             <a:endParaRPr b="0" lang="en-US" sz="1800" spc="-1" strike="noStrike">
               <a:solidFill>
@@ -4617,14 +4595,14 @@
       </p:sp>
       <p:sp>
         <p:nvSpPr>
-          <p:cNvPr id="100" name="CustomShape 2"/>
+          <p:cNvPr id="118" name="CustomShape 2"/>
           <p:cNvSpPr/>
           <p:nvPr/>
         </p:nvSpPr>
         <p:spPr>
           <a:xfrm>
             <a:off x="3869280" y="864000"/>
-            <a:ext cx="7314480" cy="5119920"/>
+            <a:ext cx="7314120" cy="5119560"/>
           </a:xfrm>
           <a:prstGeom prst="rect">
             <a:avLst/>
@@ -4643,10 +4621,15 @@
         <p:txBody>
           <a:bodyPr lIns="90000" rIns="90000" tIns="45000" bIns="45000" anchor="ctr"/>
           <a:p>
-            <a:pPr>
+            <a:pPr marL="182880" indent="-181800">
               <a:lnSpc>
-                <a:spcPct val="100000"/>
+                <a:spcPct val="150000"/>
               </a:lnSpc>
+              <a:buClr>
+                <a:srgbClr val="40bad2"/>
+              </a:buClr>
+              <a:buFont typeface="Wingdings 2" charset="2"/>
+              <a:buChar char=""/>
             </a:pPr>
             <a:r>
               <a:rPr b="0" lang="en-US" sz="2000" spc="-1" strike="noStrike">
@@ -4659,9 +4642,33 @@
                   </a:solidFill>
                 </a:uFill>
                 <a:latin typeface="Corbel"/>
-              </a:rPr>
-              <a:t>  </a:t>
-            </a:r>
+                <a:ea typeface="DejaVu Sans"/>
+              </a:rPr>
+              <a:t>Design a user interface</a:t>
+            </a:r>
+            <a:endParaRPr b="0" lang="en-US" sz="1800" spc="-1" strike="noStrike">
+              <a:solidFill>
+                <a:srgbClr val="000000"/>
+              </a:solidFill>
+              <a:uFill>
+                <a:solidFill>
+                  <a:srgbClr val="ffffff"/>
+                </a:solidFill>
+              </a:uFill>
+              <a:latin typeface="Arial"/>
+            </a:endParaRPr>
+          </a:p>
+          <a:p>
+            <a:pPr marL="182880" indent="-181800">
+              <a:lnSpc>
+                <a:spcPct val="150000"/>
+              </a:lnSpc>
+              <a:buClr>
+                <a:srgbClr val="40bad2"/>
+              </a:buClr>
+              <a:buFont typeface="Wingdings 2" charset="2"/>
+              <a:buChar char=""/>
+            </a:pPr>
             <a:r>
               <a:rPr b="0" lang="en-US" sz="2000" spc="-1" strike="noStrike">
                 <a:solidFill>
@@ -4673,8 +4680,199 @@
                   </a:solidFill>
                 </a:uFill>
                 <a:latin typeface="Corbel"/>
-              </a:rPr>
-              <a:t>Questions?</a:t>
+                <a:ea typeface="DejaVu Sans"/>
+              </a:rPr>
+              <a:t>Set up interaction with the camera app to retrieve barcode images</a:t>
+            </a:r>
+            <a:endParaRPr b="0" lang="en-US" sz="1800" spc="-1" strike="noStrike">
+              <a:solidFill>
+                <a:srgbClr val="000000"/>
+              </a:solidFill>
+              <a:uFill>
+                <a:solidFill>
+                  <a:srgbClr val="ffffff"/>
+                </a:solidFill>
+              </a:uFill>
+              <a:latin typeface="Arial"/>
+            </a:endParaRPr>
+          </a:p>
+          <a:p>
+            <a:pPr marL="182880" indent="-181800">
+              <a:lnSpc>
+                <a:spcPct val="150000"/>
+              </a:lnSpc>
+              <a:buClr>
+                <a:srgbClr val="40bad2"/>
+              </a:buClr>
+              <a:buFont typeface="Wingdings 2" charset="2"/>
+              <a:buChar char=""/>
+            </a:pPr>
+            <a:r>
+              <a:rPr b="0" lang="en-US" sz="2000" spc="-1" strike="noStrike">
+                <a:solidFill>
+                  <a:srgbClr val="595959"/>
+                </a:solidFill>
+                <a:uFill>
+                  <a:solidFill>
+                    <a:srgbClr val="ffffff"/>
+                  </a:solidFill>
+                </a:uFill>
+                <a:latin typeface="Corbel"/>
+                <a:ea typeface="DejaVu Sans"/>
+              </a:rPr>
+              <a:t>Class Assignments:</a:t>
+            </a:r>
+            <a:endParaRPr b="0" lang="en-US" sz="1800" spc="-1" strike="noStrike">
+              <a:solidFill>
+                <a:srgbClr val="000000"/>
+              </a:solidFill>
+              <a:uFill>
+                <a:solidFill>
+                  <a:srgbClr val="ffffff"/>
+                </a:solidFill>
+              </a:uFill>
+              <a:latin typeface="Arial"/>
+            </a:endParaRPr>
+          </a:p>
+          <a:p>
+            <a:pPr lvl="1" marL="685800" indent="-181800">
+              <a:lnSpc>
+                <a:spcPct val="150000"/>
+              </a:lnSpc>
+              <a:buClr>
+                <a:srgbClr val="40bad2"/>
+              </a:buClr>
+              <a:buFont typeface="Wingdings 2" charset="2"/>
+              <a:buChar char=""/>
+            </a:pPr>
+            <a:r>
+              <a:rPr b="0" lang="en-US" sz="1800" spc="-1" strike="noStrike">
+                <a:solidFill>
+                  <a:srgbClr val="595959"/>
+                </a:solidFill>
+                <a:uFill>
+                  <a:solidFill>
+                    <a:srgbClr val="ffffff"/>
+                  </a:solidFill>
+                </a:uFill>
+                <a:latin typeface="Corbel"/>
+                <a:ea typeface="DejaVu Sans"/>
+              </a:rPr>
+              <a:t>ItemType</a:t>
+            </a:r>
+            <a:endParaRPr b="0" lang="en-US" sz="1800" spc="-1" strike="noStrike">
+              <a:solidFill>
+                <a:srgbClr val="000000"/>
+              </a:solidFill>
+              <a:uFill>
+                <a:solidFill>
+                  <a:srgbClr val="ffffff"/>
+                </a:solidFill>
+              </a:uFill>
+              <a:latin typeface="Arial"/>
+            </a:endParaRPr>
+          </a:p>
+          <a:p>
+            <a:pPr lvl="1" marL="685800" indent="-181800">
+              <a:lnSpc>
+                <a:spcPct val="150000"/>
+              </a:lnSpc>
+              <a:buClr>
+                <a:srgbClr val="40bad2"/>
+              </a:buClr>
+              <a:buFont typeface="Wingdings 2" charset="2"/>
+              <a:buChar char=""/>
+            </a:pPr>
+            <a:r>
+              <a:rPr b="0" lang="en-US" sz="1800" spc="-1" strike="noStrike">
+                <a:solidFill>
+                  <a:srgbClr val="595959"/>
+                </a:solidFill>
+                <a:uFill>
+                  <a:solidFill>
+                    <a:srgbClr val="ffffff"/>
+                  </a:solidFill>
+                </a:uFill>
+                <a:latin typeface="Corbel"/>
+                <a:ea typeface="DejaVu Sans"/>
+              </a:rPr>
+              <a:t>MainActivity</a:t>
+            </a:r>
+            <a:endParaRPr b="0" lang="en-US" sz="1800" spc="-1" strike="noStrike">
+              <a:solidFill>
+                <a:srgbClr val="000000"/>
+              </a:solidFill>
+              <a:uFill>
+                <a:solidFill>
+                  <a:srgbClr val="ffffff"/>
+                </a:solidFill>
+              </a:uFill>
+              <a:latin typeface="Arial"/>
+            </a:endParaRPr>
+          </a:p>
+          <a:p>
+            <a:pPr lvl="1" marL="685800" indent="-181800">
+              <a:lnSpc>
+                <a:spcPct val="150000"/>
+              </a:lnSpc>
+              <a:buClr>
+                <a:srgbClr val="40bad2"/>
+              </a:buClr>
+              <a:buFont typeface="Wingdings 2" charset="2"/>
+              <a:buChar char=""/>
+            </a:pPr>
+            <a:r>
+              <a:rPr b="0" lang="en-US" sz="1800" spc="-1" strike="noStrike">
+                <a:solidFill>
+                  <a:srgbClr val="595959"/>
+                </a:solidFill>
+                <a:uFill>
+                  <a:solidFill>
+                    <a:srgbClr val="ffffff"/>
+                  </a:solidFill>
+                </a:uFill>
+                <a:latin typeface="Corbel"/>
+                <a:ea typeface="DejaVu Sans"/>
+              </a:rPr>
+              <a:t>ResultsActivity</a:t>
+            </a:r>
+            <a:endParaRPr b="0" lang="en-US" sz="1800" spc="-1" strike="noStrike">
+              <a:solidFill>
+                <a:srgbClr val="000000"/>
+              </a:solidFill>
+              <a:uFill>
+                <a:solidFill>
+                  <a:srgbClr val="ffffff"/>
+                </a:solidFill>
+              </a:uFill>
+              <a:latin typeface="Arial"/>
+            </a:endParaRPr>
+          </a:p>
+          <a:p>
+            <a:pPr lvl="1" marL="685800" indent="-181800">
+              <a:lnSpc>
+                <a:spcPct val="150000"/>
+              </a:lnSpc>
+              <a:buClr>
+                <a:srgbClr val="40bad2"/>
+              </a:buClr>
+              <a:buFont typeface="Wingdings 2" charset="2"/>
+              <a:buChar char=""/>
+            </a:pPr>
+            <a:r>
+              <a:rPr b="0" lang="en-US" sz="1800" spc="-1" strike="noStrike">
+                <a:solidFill>
+                  <a:srgbClr val="595959"/>
+                </a:solidFill>
+                <a:uFill>
+                  <a:solidFill>
+                    <a:srgbClr val="ffffff"/>
+                  </a:solidFill>
+                </a:uFill>
+                <a:latin typeface="Corbel"/>
+                <a:ea typeface="DejaVu Sans"/>
+              </a:rPr>
+              <a:t>UI Layouts</a:t>
             </a:r>
             <a:endParaRPr b="0" lang="en-US" sz="1800" spc="-1" strike="noStrike">
               <a:solidFill>
@@ -4699,6 +4897,194 @@
           <p:childTnLst>
             <p:seq>
               <p:cTn id="22" nodeType="mainSeq"/>
+              <p:prevCondLst>
+                <p:cond delay="0" evt="onPrev">
+                  <p:tgtEl>
+                    <p:sldTgt/>
+                  </p:tgtEl>
+                </p:cond>
+              </p:prevCondLst>
+              <p:nextCondLst>
+                <p:cond delay="0" evt="onNext">
+                  <p:tgtEl>
+                    <p:sldTgt/>
+                  </p:tgtEl>
+                </p:cond>
+              </p:nextCondLst>
+            </p:seq>
+          </p:childTnLst>
+        </p:cTn>
+      </p:par>
+    </p:tnLst>
+  </p:timing>
+</p:sld>
+</file>
+
+<file path=ppt/slides/slide12.xml><?xml version="1.0" encoding="utf-8"?>
+<p:sld xmlns:a="http://schemas.openxmlformats.org/drawingml/2006/main" xmlns:p="http://schemas.openxmlformats.org/presentationml/2006/main" xmlns:r="http://schemas.openxmlformats.org/officeDocument/2006/relationships" xmlns:p14="http://schemas.microsoft.com/office/powerpoint/2010/main" xmlns:p15="http://schemas.microsoft.com/office/powerpoint/2012/main" xmlns:mc="http://schemas.openxmlformats.org/markup-compatibility/2006">
+  <p:cSld>
+    <p:spTree>
+      <p:nvGrpSpPr>
+        <p:cNvPr id="1" name=""/>
+        <p:cNvGrpSpPr/>
+        <p:nvPr/>
+      </p:nvGrpSpPr>
+      <p:grpSpPr>
+        <a:xfrm>
+          <a:off x="0" y="0"/>
+          <a:ext cx="0" cy="0"/>
+          <a:chOff x="0" y="0"/>
+          <a:chExt cx="0" cy="0"/>
+        </a:xfrm>
+      </p:grpSpPr>
+      <p:sp>
+        <p:nvSpPr>
+          <p:cNvPr id="119" name="CustomShape 1"/>
+          <p:cNvSpPr/>
+          <p:nvPr/>
+        </p:nvSpPr>
+        <p:spPr>
+          <a:xfrm>
+            <a:off x="253080" y="1123920"/>
+            <a:ext cx="2946240" cy="4600080"/>
+          </a:xfrm>
+          <a:prstGeom prst="rect">
+            <a:avLst/>
+          </a:prstGeom>
+          <a:noFill/>
+          <a:ln>
+            <a:noFill/>
+          </a:ln>
+        </p:spPr>
+        <p:style>
+          <a:lnRef idx="0"/>
+          <a:fillRef idx="0"/>
+          <a:effectRef idx="0"/>
+          <a:fontRef idx="minor"/>
+        </p:style>
+        <p:txBody>
+          <a:bodyPr lIns="90000" rIns="90000" tIns="45000" bIns="45000" anchor="ctr"/>
+          <a:p>
+            <a:pPr>
+              <a:lnSpc>
+                <a:spcPct val="90000"/>
+              </a:lnSpc>
+            </a:pPr>
+            <a:r>
+              <a:rPr b="0" lang="en-US" sz="3600" spc="-52" strike="noStrike">
+                <a:solidFill>
+                  <a:srgbClr val="ffffff"/>
+                </a:solidFill>
+                <a:uFill>
+                  <a:solidFill>
+                    <a:srgbClr val="ffffff"/>
+                  </a:solidFill>
+                </a:uFill>
+                <a:latin typeface="Corbel"/>
+                <a:ea typeface="DejaVu Sans"/>
+              </a:rPr>
+              <a:t>Conclusion</a:t>
+            </a:r>
+            <a:endParaRPr b="0" lang="en-US" sz="1800" spc="-1" strike="noStrike">
+              <a:solidFill>
+                <a:srgbClr val="000000"/>
+              </a:solidFill>
+              <a:uFill>
+                <a:solidFill>
+                  <a:srgbClr val="ffffff"/>
+                </a:solidFill>
+              </a:uFill>
+              <a:latin typeface="Arial"/>
+            </a:endParaRPr>
+          </a:p>
+        </p:txBody>
+      </p:sp>
+      <p:sp>
+        <p:nvSpPr>
+          <p:cNvPr id="120" name="CustomShape 2"/>
+          <p:cNvSpPr/>
+          <p:nvPr/>
+        </p:nvSpPr>
+        <p:spPr>
+          <a:xfrm>
+            <a:off x="3869280" y="864000"/>
+            <a:ext cx="7314120" cy="5119560"/>
+          </a:xfrm>
+          <a:prstGeom prst="rect">
+            <a:avLst/>
+          </a:prstGeom>
+          <a:noFill/>
+          <a:ln>
+            <a:noFill/>
+          </a:ln>
+        </p:spPr>
+        <p:style>
+          <a:lnRef idx="0"/>
+          <a:fillRef idx="0"/>
+          <a:effectRef idx="0"/>
+          <a:fontRef idx="minor"/>
+        </p:style>
+        <p:txBody>
+          <a:bodyPr lIns="90000" rIns="90000" tIns="45000" bIns="45000" anchor="ctr"/>
+          <a:p>
+            <a:pPr>
+              <a:lnSpc>
+                <a:spcPct val="100000"/>
+              </a:lnSpc>
+            </a:pPr>
+            <a:r>
+              <a:rPr b="0" lang="en-US" sz="2000" spc="-1" strike="noStrike">
+                <a:solidFill>
+                  <a:srgbClr val="595959"/>
+                </a:solidFill>
+                <a:uFill>
+                  <a:solidFill>
+                    <a:srgbClr val="ffffff"/>
+                  </a:solidFill>
+                </a:uFill>
+                <a:latin typeface="Corbel"/>
+                <a:ea typeface="DejaVu Sans"/>
+              </a:rPr>
+              <a:t>  </a:t>
+            </a:r>
+            <a:r>
+              <a:rPr b="0" lang="en-US" sz="2000" spc="-1" strike="noStrike">
+                <a:solidFill>
+                  <a:srgbClr val="595959"/>
+                </a:solidFill>
+                <a:uFill>
+                  <a:solidFill>
+                    <a:srgbClr val="ffffff"/>
+                  </a:solidFill>
+                </a:uFill>
+                <a:latin typeface="Corbel"/>
+                <a:ea typeface="DejaVu Sans"/>
+              </a:rPr>
+              <a:t>Questions?</a:t>
+            </a:r>
+            <a:endParaRPr b="0" lang="en-US" sz="1800" spc="-1" strike="noStrike">
+              <a:solidFill>
+                <a:srgbClr val="000000"/>
+              </a:solidFill>
+              <a:uFill>
+                <a:solidFill>
+                  <a:srgbClr val="ffffff"/>
+                </a:solidFill>
+              </a:uFill>
+              <a:latin typeface="Arial"/>
+            </a:endParaRPr>
+          </a:p>
+        </p:txBody>
+      </p:sp>
+    </p:spTree>
+  </p:cSld>
+  <p:timing>
+    <p:tnLst>
+      <p:par>
+        <p:cTn id="23" dur="indefinite" restart="never" nodeType="tmRoot">
+          <p:childTnLst>
+            <p:seq>
+              <p:cTn id="24" nodeType="mainSeq"/>
               <p:prevCondLst>
                 <p:cond delay="0" evt="onPrev">
                   <p:tgtEl>
@@ -4748,7 +5134,7 @@
         <p:spPr>
           <a:xfrm>
             <a:off x="253080" y="1123920"/>
-            <a:ext cx="2946600" cy="4600440"/>
+            <a:ext cx="2946240" cy="4600080"/>
           </a:xfrm>
           <a:prstGeom prst="rect">
             <a:avLst/>
@@ -4773,7 +5159,7 @@
               </a:lnSpc>
             </a:pPr>
             <a:r>
-              <a:rPr b="0" lang="en-US" sz="3600" spc="-55" strike="noStrike">
+              <a:rPr b="0" lang="en-US" sz="3600" spc="-52" strike="noStrike">
                 <a:solidFill>
                   <a:srgbClr val="ffffff"/>
                 </a:solidFill>
@@ -4783,6 +5169,7 @@
                   </a:solidFill>
                 </a:uFill>
                 <a:latin typeface="Corbel"/>
+                <a:ea typeface="DejaVu Sans"/>
               </a:rPr>
               <a:t>Project Goal</a:t>
             </a:r>
@@ -4809,7 +5196,7 @@
         <p:spPr>
           <a:xfrm>
             <a:off x="3869280" y="864000"/>
-            <a:ext cx="7314480" cy="5119920"/>
+            <a:ext cx="7314120" cy="5119560"/>
           </a:xfrm>
           <a:prstGeom prst="rect">
             <a:avLst/>
@@ -4828,7 +5215,7 @@
         <p:txBody>
           <a:bodyPr lIns="90000" rIns="90000" tIns="45000" bIns="45000" anchor="ctr"/>
           <a:p>
-            <a:pPr marL="182880" indent="-182160">
+            <a:pPr marL="182880" indent="-181800">
               <a:lnSpc>
                 <a:spcPct val="200000"/>
               </a:lnSpc>
@@ -4849,6 +5236,7 @@
                   </a:solidFill>
                 </a:uFill>
                 <a:latin typeface="Corbel"/>
+                <a:ea typeface="DejaVu Sans"/>
               </a:rPr>
               <a:t>Help users organize and easily visualize their groceries by using a UPC supplied database. </a:t>
             </a:r>
@@ -4865,7 +5253,7 @@
             </a:endParaRPr>
           </a:p>
           <a:p>
-            <a:pPr marL="182880" indent="-182160">
+            <a:pPr marL="182880" indent="-181800">
               <a:lnSpc>
                 <a:spcPct val="200000"/>
               </a:lnSpc>
@@ -4886,6 +5274,7 @@
                   </a:solidFill>
                 </a:uFill>
                 <a:latin typeface="Corbel"/>
+                <a:ea typeface="DejaVu Sans"/>
               </a:rPr>
               <a:t>Barcode scan their groceries as they unpack them, adding them to their current list with a single button press. </a:t>
             </a:r>
@@ -4902,7 +5291,7 @@
             </a:endParaRPr>
           </a:p>
           <a:p>
-            <a:pPr marL="182880" indent="-182160">
+            <a:pPr marL="182880" indent="-181800">
               <a:lnSpc>
                 <a:spcPct val="200000"/>
               </a:lnSpc>
@@ -4923,6 +5312,7 @@
                   </a:solidFill>
                 </a:uFill>
                 <a:latin typeface="Corbel"/>
+                <a:ea typeface="DejaVu Sans"/>
               </a:rPr>
               <a:t>Automatically add tags for food type and expiry, so users can easily sort their grocery list by what to eat (or throw away) next.</a:t>
             </a:r>
@@ -4998,7 +5388,7 @@
         <p:spPr>
           <a:xfrm>
             <a:off x="253080" y="1123920"/>
-            <a:ext cx="2946600" cy="4600440"/>
+            <a:ext cx="2946240" cy="4600080"/>
           </a:xfrm>
           <a:prstGeom prst="rect">
             <a:avLst/>
@@ -5023,7 +5413,7 @@
               </a:lnSpc>
             </a:pPr>
             <a:r>
-              <a:rPr b="0" lang="en-US" sz="3600" spc="-55" strike="noStrike">
+              <a:rPr b="0" lang="en-US" sz="3600" spc="-52" strike="noStrike">
                 <a:solidFill>
                   <a:srgbClr val="ffffff"/>
                 </a:solidFill>
@@ -5033,6 +5423,7 @@
                   </a:solidFill>
                 </a:uFill>
                 <a:latin typeface="Corbel"/>
+                <a:ea typeface="DejaVu Sans"/>
               </a:rPr>
               <a:t>Project Features</a:t>
             </a:r>
@@ -5059,7 +5450,7 @@
         <p:spPr>
           <a:xfrm>
             <a:off x="3869280" y="864000"/>
-            <a:ext cx="7314480" cy="5119920"/>
+            <a:ext cx="7314120" cy="5119560"/>
           </a:xfrm>
           <a:prstGeom prst="rect">
             <a:avLst/>
@@ -5078,7 +5469,7 @@
         <p:txBody>
           <a:bodyPr lIns="90000" rIns="90000" tIns="45000" bIns="45000" anchor="ctr"/>
           <a:p>
-            <a:pPr marL="182880" indent="-182160">
+            <a:pPr marL="182880" indent="-181800">
               <a:lnSpc>
                 <a:spcPct val="200000"/>
               </a:lnSpc>
@@ -5099,6 +5490,7 @@
                   </a:solidFill>
                 </a:uFill>
                 <a:latin typeface="Corbel"/>
+                <a:ea typeface="DejaVu Sans"/>
               </a:rPr>
               <a:t>Scan food item barcodes from camera</a:t>
             </a:r>
@@ -5115,7 +5507,7 @@
             </a:endParaRPr>
           </a:p>
           <a:p>
-            <a:pPr marL="182880" indent="-182160">
+            <a:pPr marL="182880" indent="-181800">
               <a:lnSpc>
                 <a:spcPct val="200000"/>
               </a:lnSpc>
@@ -5136,6 +5528,7 @@
                   </a:solidFill>
                 </a:uFill>
                 <a:latin typeface="Corbel"/>
+                <a:ea typeface="DejaVu Sans"/>
               </a:rPr>
               <a:t>Fetch barcode UPC info using Computer Vision API</a:t>
             </a:r>
@@ -5152,7 +5545,7 @@
             </a:endParaRPr>
           </a:p>
           <a:p>
-            <a:pPr marL="182880" indent="-182160">
+            <a:pPr marL="182880" indent="-181800">
               <a:lnSpc>
                 <a:spcPct val="200000"/>
               </a:lnSpc>
@@ -5173,6 +5566,7 @@
                   </a:solidFill>
                 </a:uFill>
                 <a:latin typeface="Corbel"/>
+                <a:ea typeface="DejaVu Sans"/>
               </a:rPr>
               <a:t>Store UPC Items in a database</a:t>
             </a:r>
@@ -5189,7 +5583,7 @@
             </a:endParaRPr>
           </a:p>
           <a:p>
-            <a:pPr marL="182880" indent="-182160">
+            <a:pPr marL="182880" indent="-181800">
               <a:lnSpc>
                 <a:spcPct val="200000"/>
               </a:lnSpc>
@@ -5210,6 +5604,7 @@
                   </a:solidFill>
                 </a:uFill>
                 <a:latin typeface="Corbel"/>
+                <a:ea typeface="DejaVu Sans"/>
               </a:rPr>
               <a:t>Sort UPC Items by food category or expiration date</a:t>
             </a:r>
@@ -5303,7 +5698,7 @@
         <p:spPr>
           <a:xfrm>
             <a:off x="253080" y="1123920"/>
-            <a:ext cx="2946600" cy="4600440"/>
+            <a:ext cx="2946240" cy="4600080"/>
           </a:xfrm>
           <a:prstGeom prst="rect">
             <a:avLst/>
@@ -5328,7 +5723,7 @@
               </a:lnSpc>
             </a:pPr>
             <a:r>
-              <a:rPr b="0" lang="en-US" sz="3600" spc="-55" strike="noStrike">
+              <a:rPr b="0" lang="en-US" sz="3600" spc="-52" strike="noStrike">
                 <a:solidFill>
                   <a:srgbClr val="ffffff"/>
                 </a:solidFill>
@@ -5338,6 +5733,7 @@
                   </a:solidFill>
                 </a:uFill>
                 <a:latin typeface="Corbel"/>
+                <a:ea typeface="DejaVu Sans"/>
               </a:rPr>
               <a:t>Video Demo</a:t>
             </a:r>
@@ -5364,7 +5760,7 @@
         <p:spPr>
           <a:xfrm>
             <a:off x="3869280" y="864000"/>
-            <a:ext cx="7314480" cy="5119920"/>
+            <a:ext cx="7314120" cy="5119560"/>
           </a:xfrm>
           <a:prstGeom prst="rect">
             <a:avLst/>
@@ -5383,7 +5779,7 @@
         <p:txBody>
           <a:bodyPr lIns="90000" rIns="90000" tIns="45000" bIns="45000" anchor="ctr"/>
           <a:p>
-            <a:pPr marL="182880" indent="-182160">
+            <a:pPr marL="182880" indent="-181800">
               <a:lnSpc>
                 <a:spcPct val="200000"/>
               </a:lnSpc>
@@ -5404,6 +5800,7 @@
                   </a:solidFill>
                 </a:uFill>
                 <a:latin typeface="Corbel"/>
+                <a:ea typeface="DejaVu Sans"/>
               </a:rPr>
               <a:t> </a:t>
             </a:r>
@@ -5497,7 +5894,7 @@
         <p:spPr>
           <a:xfrm>
             <a:off x="253080" y="1123920"/>
-            <a:ext cx="2946600" cy="4600440"/>
+            <a:ext cx="2946240" cy="4600080"/>
           </a:xfrm>
           <a:prstGeom prst="rect">
             <a:avLst/>
@@ -5522,7 +5919,7 @@
               </a:lnSpc>
             </a:pPr>
             <a:r>
-              <a:rPr b="0" lang="en-US" sz="3600" spc="-55" strike="noStrike">
+              <a:rPr b="0" lang="en-US" sz="3600" spc="-52" strike="noStrike">
                 <a:solidFill>
                   <a:srgbClr val="ffffff"/>
                 </a:solidFill>
@@ -5532,6 +5929,7 @@
                   </a:solidFill>
                 </a:uFill>
                 <a:latin typeface="Corbel"/>
+                <a:ea typeface="DejaVu Sans"/>
               </a:rPr>
               <a:t>Video Demo</a:t>
             </a:r>
@@ -5558,7 +5956,7 @@
         <p:spPr>
           <a:xfrm>
             <a:off x="3869280" y="864000"/>
-            <a:ext cx="7314480" cy="5119920"/>
+            <a:ext cx="7314120" cy="5119560"/>
           </a:xfrm>
           <a:prstGeom prst="rect">
             <a:avLst/>
@@ -5577,7 +5975,7 @@
         <p:txBody>
           <a:bodyPr lIns="90000" rIns="90000" tIns="45000" bIns="45000" anchor="ctr"/>
           <a:p>
-            <a:pPr marL="182880" indent="-182160">
+            <a:pPr marL="182880" indent="-181800">
               <a:lnSpc>
                 <a:spcPct val="200000"/>
               </a:lnSpc>
@@ -5598,6 +5996,7 @@
                   </a:solidFill>
                 </a:uFill>
                 <a:latin typeface="Corbel"/>
+                <a:ea typeface="DejaVu Sans"/>
               </a:rPr>
               <a:t> </a:t>
             </a:r>
@@ -5691,7 +6090,7 @@
         <p:spPr>
           <a:xfrm>
             <a:off x="253080" y="1123920"/>
-            <a:ext cx="2946600" cy="4600440"/>
+            <a:ext cx="2946240" cy="4600080"/>
           </a:xfrm>
           <a:prstGeom prst="rect">
             <a:avLst/>
@@ -5711,7 +6110,7 @@
           <a:bodyPr lIns="90000" rIns="90000" tIns="45000" bIns="45000" anchor="ctr"/>
           <a:p>
             <a:r>
-              <a:rPr b="0" lang="en-US" sz="3600" spc="-55" strike="noStrike">
+              <a:rPr b="0" lang="en-US" sz="3600" spc="-52" strike="noStrike">
                 <a:solidFill>
                   <a:srgbClr val="ffffff"/>
                 </a:solidFill>
@@ -5721,6 +6120,7 @@
                   </a:solidFill>
                 </a:uFill>
                 <a:latin typeface="Corbel"/>
+                <a:ea typeface="DejaVu Sans"/>
               </a:rPr>
               <a:t>Our Code</a:t>
             </a:r>
@@ -5747,7 +6147,7 @@
         <p:spPr>
           <a:xfrm>
             <a:off x="3869280" y="864000"/>
-            <a:ext cx="7314480" cy="5119920"/>
+            <a:ext cx="7314120" cy="5119560"/>
           </a:xfrm>
           <a:prstGeom prst="rect">
             <a:avLst/>
@@ -5766,7 +6166,7 @@
         <p:txBody>
           <a:bodyPr lIns="90000" rIns="90000" tIns="45000" bIns="45000" anchor="ctr"/>
           <a:p>
-            <a:pPr marL="182880" indent="-182160">
+            <a:pPr marL="182880" indent="-181800">
               <a:lnSpc>
                 <a:spcPct val="150000"/>
               </a:lnSpc>
@@ -5787,6 +6187,7 @@
                   </a:solidFill>
                 </a:uFill>
                 <a:latin typeface="Corbel"/>
+                <a:ea typeface="DejaVu Sans"/>
               </a:rPr>
               <a:t>Upc Item</a:t>
             </a:r>
@@ -5803,7 +6204,7 @@
             </a:endParaRPr>
           </a:p>
           <a:p>
-            <a:pPr lvl="1" marL="432000" indent="-216000">
+            <a:pPr lvl="1" marL="432000" indent="-215640">
               <a:lnSpc>
                 <a:spcPct val="150000"/>
               </a:lnSpc>
@@ -5825,6 +6226,7 @@
                   </a:solidFill>
                 </a:uFill>
                 <a:latin typeface="Corbel"/>
+                <a:ea typeface="DejaVu Sans"/>
               </a:rPr>
               <a:t>A product with a barcode ID, category (dairy, meat, etc.), and thumbnail image</a:t>
             </a:r>
@@ -5841,7 +6243,7 @@
             </a:endParaRPr>
           </a:p>
           <a:p>
-            <a:pPr marL="182880" indent="-182160">
+            <a:pPr marL="182880" indent="-181800">
               <a:lnSpc>
                 <a:spcPct val="150000"/>
               </a:lnSpc>
@@ -5862,6 +6264,7 @@
                   </a:solidFill>
                 </a:uFill>
                 <a:latin typeface="Corbel"/>
+                <a:ea typeface="DejaVu Sans"/>
               </a:rPr>
               <a:t>Item Type</a:t>
             </a:r>
@@ -5878,7 +6281,7 @@
             </a:endParaRPr>
           </a:p>
           <a:p>
-            <a:pPr lvl="1" marL="432000" indent="-216000">
+            <a:pPr lvl="1" marL="432000" indent="-215640">
               <a:lnSpc>
                 <a:spcPct val="150000"/>
               </a:lnSpc>
@@ -5900,6 +6303,7 @@
                   </a:solidFill>
                 </a:uFill>
                 <a:latin typeface="Corbel"/>
+                <a:ea typeface="DejaVu Sans"/>
               </a:rPr>
               <a:t>Assigns a shelf life to products based on their categories</a:t>
             </a:r>
@@ -5916,7 +6320,7 @@
             </a:endParaRPr>
           </a:p>
           <a:p>
-            <a:pPr marL="182880" indent="-182160">
+            <a:pPr marL="182880" indent="-181800">
               <a:lnSpc>
                 <a:spcPct val="150000"/>
               </a:lnSpc>
@@ -5937,6 +6341,7 @@
                   </a:solidFill>
                 </a:uFill>
                 <a:latin typeface="Corbel"/>
+                <a:ea typeface="DejaVu Sans"/>
               </a:rPr>
               <a:t>Network Utilities</a:t>
             </a:r>
@@ -5953,7 +6358,7 @@
             </a:endParaRPr>
           </a:p>
           <a:p>
-            <a:pPr lvl="1" marL="432000" indent="-216000">
+            <a:pPr lvl="1" marL="432000" indent="-215640">
               <a:lnSpc>
                 <a:spcPct val="150000"/>
               </a:lnSpc>
@@ -5975,6 +6380,7 @@
                   </a:solidFill>
                 </a:uFill>
                 <a:latin typeface="Corbel"/>
+                <a:ea typeface="DejaVu Sans"/>
               </a:rPr>
               <a:t>Calls UpcDatabase API to retrieve a product name from a UPC</a:t>
             </a:r>
@@ -5991,7 +6397,7 @@
             </a:endParaRPr>
           </a:p>
           <a:p>
-            <a:pPr lvl="1" marL="432000" indent="-216000">
+            <a:pPr lvl="1" marL="432000" indent="-215640">
               <a:lnSpc>
                 <a:spcPct val="150000"/>
               </a:lnSpc>
@@ -6013,6 +6419,7 @@
                   </a:solidFill>
                 </a:uFill>
                 <a:latin typeface="Corbel"/>
+                <a:ea typeface="DejaVu Sans"/>
               </a:rPr>
               <a:t>Uses Google CSE to fetch a thumbnail image</a:t>
             </a:r>
@@ -6029,7 +6436,7 @@
             </a:endParaRPr>
           </a:p>
           <a:p>
-            <a:pPr lvl="1" marL="432000" indent="-216000">
+            <a:pPr lvl="1" marL="432000" indent="-215640">
               <a:lnSpc>
                 <a:spcPct val="150000"/>
               </a:lnSpc>
@@ -6051,44 +6458,7 @@
                   </a:solidFill>
                 </a:uFill>
                 <a:latin typeface="Corbel"/>
-              </a:rPr>
-              <a:t> </a:t>
-            </a:r>
-            <a:endParaRPr b="0" lang="en-US" sz="1800" spc="-1" strike="noStrike">
-              <a:solidFill>
-                <a:srgbClr val="000000"/>
-              </a:solidFill>
-              <a:uFill>
-                <a:solidFill>
-                  <a:srgbClr val="ffffff"/>
-                </a:solidFill>
-              </a:uFill>
-              <a:latin typeface="Arial"/>
-            </a:endParaRPr>
-          </a:p>
-          <a:p>
-            <a:pPr lvl="1" marL="432000" indent="-216000">
-              <a:lnSpc>
-                <a:spcPct val="150000"/>
-              </a:lnSpc>
-              <a:buClr>
-                <a:srgbClr val="000000"/>
-              </a:buClr>
-              <a:buSzPct val="45000"/>
-              <a:buFont typeface="Wingdings" charset="2"/>
-              <a:buChar char=""/>
-            </a:pPr>
-            <a:r>
-              <a:rPr b="0" lang="en-US" sz="2000" spc="-1" strike="noStrike">
-                <a:solidFill>
-                  <a:srgbClr val="595959"/>
-                </a:solidFill>
-                <a:uFill>
-                  <a:solidFill>
-                    <a:srgbClr val="ffffff"/>
-                  </a:solidFill>
-                </a:uFill>
-                <a:latin typeface="Corbel"/>
+                <a:ea typeface="DejaVu Sans"/>
               </a:rPr>
               <a:t> </a:t>
             </a:r>
@@ -6164,7 +6534,7 @@
         <p:spPr>
           <a:xfrm>
             <a:off x="253080" y="1123920"/>
-            <a:ext cx="2946600" cy="4600440"/>
+            <a:ext cx="2946240" cy="4600080"/>
           </a:xfrm>
           <a:prstGeom prst="rect">
             <a:avLst/>
@@ -6184,7 +6554,7 @@
           <a:bodyPr lIns="90000" rIns="90000" tIns="45000" bIns="45000" anchor="ctr"/>
           <a:p>
             <a:r>
-              <a:rPr b="0" lang="en-US" sz="3600" spc="-55" strike="noStrike">
+              <a:rPr b="0" lang="en-US" sz="3600" spc="-52" strike="noStrike">
                 <a:solidFill>
                   <a:srgbClr val="ffffff"/>
                 </a:solidFill>
@@ -6194,6 +6564,7 @@
                   </a:solidFill>
                 </a:uFill>
                 <a:latin typeface="Corbel"/>
+                <a:ea typeface="DejaVu Sans"/>
               </a:rPr>
               <a:t>Our Code</a:t>
             </a:r>
@@ -6220,7 +6591,7 @@
         <p:spPr>
           <a:xfrm>
             <a:off x="3932640" y="1006560"/>
-            <a:ext cx="7314480" cy="5119920"/>
+            <a:ext cx="7314120" cy="5119560"/>
           </a:xfrm>
           <a:prstGeom prst="rect">
             <a:avLst/>
@@ -6239,7 +6610,7 @@
         <p:txBody>
           <a:bodyPr lIns="90000" rIns="90000" tIns="45000" bIns="45000" anchor="ctr"/>
           <a:p>
-            <a:pPr marL="182880" indent="-182160">
+            <a:pPr marL="182880" indent="-181800">
               <a:lnSpc>
                 <a:spcPct val="150000"/>
               </a:lnSpc>
@@ -6260,6 +6631,7 @@
                   </a:solidFill>
                 </a:uFill>
                 <a:latin typeface="Corbel"/>
+                <a:ea typeface="DejaVu Sans"/>
               </a:rPr>
               <a:t>Main Activity</a:t>
             </a:r>
@@ -6276,7 +6648,7 @@
             </a:endParaRPr>
           </a:p>
           <a:p>
-            <a:pPr lvl="1" marL="432000" indent="-216000">
+            <a:pPr lvl="1" marL="432000" indent="-215640">
               <a:lnSpc>
                 <a:spcPct val="150000"/>
               </a:lnSpc>
@@ -6298,6 +6670,7 @@
                   </a:solidFill>
                 </a:uFill>
                 <a:latin typeface="Corbel"/>
+                <a:ea typeface="DejaVu Sans"/>
               </a:rPr>
               <a:t>Opens a camera to capture a barcode image</a:t>
             </a:r>
@@ -6314,7 +6687,7 @@
             </a:endParaRPr>
           </a:p>
           <a:p>
-            <a:pPr marL="182880" indent="-182160">
+            <a:pPr marL="182880" indent="-181800">
               <a:lnSpc>
                 <a:spcPct val="150000"/>
               </a:lnSpc>
@@ -6335,6 +6708,7 @@
                   </a:solidFill>
                 </a:uFill>
                 <a:latin typeface="Corbel"/>
+                <a:ea typeface="DejaVu Sans"/>
               </a:rPr>
               <a:t>Results Activity</a:t>
             </a:r>
@@ -6351,7 +6725,7 @@
             </a:endParaRPr>
           </a:p>
           <a:p>
-            <a:pPr lvl="1" marL="432000" indent="-216000">
+            <a:pPr lvl="1" marL="432000" indent="-215640">
               <a:lnSpc>
                 <a:spcPct val="150000"/>
               </a:lnSpc>
@@ -6373,6 +6747,7 @@
                   </a:solidFill>
                 </a:uFill>
                 <a:latin typeface="Corbel"/>
+                <a:ea typeface="DejaVu Sans"/>
               </a:rPr>
               <a:t>Converts images to barcodes using the Google Play Services Barcode API</a:t>
             </a:r>
@@ -6389,7 +6764,7 @@
             </a:endParaRPr>
           </a:p>
           <a:p>
-            <a:pPr marL="182880" indent="-182160">
+            <a:pPr marL="182880" indent="-181800">
               <a:lnSpc>
                 <a:spcPct val="150000"/>
               </a:lnSpc>
@@ -6410,6 +6785,7 @@
                   </a:solidFill>
                 </a:uFill>
                 <a:latin typeface="Corbel"/>
+                <a:ea typeface="DejaVu Sans"/>
               </a:rPr>
               <a:t>Settings</a:t>
             </a:r>
@@ -6426,7 +6802,7 @@
             </a:endParaRPr>
           </a:p>
           <a:p>
-            <a:pPr lvl="1" marL="432000" indent="-216000">
+            <a:pPr lvl="1" marL="432000" indent="-215640">
               <a:lnSpc>
                 <a:spcPct val="150000"/>
               </a:lnSpc>
@@ -6448,6 +6824,7 @@
                   </a:solidFill>
                 </a:uFill>
                 <a:latin typeface="Corbel"/>
+                <a:ea typeface="DejaVu Sans"/>
               </a:rPr>
               <a:t>Filter products by category</a:t>
             </a:r>
@@ -6464,7 +6841,7 @@
             </a:endParaRPr>
           </a:p>
           <a:p>
-            <a:pPr lvl="1" marL="432000" indent="-216000">
+            <a:pPr lvl="1" marL="432000" indent="-215640">
               <a:lnSpc>
                 <a:spcPct val="150000"/>
               </a:lnSpc>
@@ -6486,6 +6863,7 @@
                   </a:solidFill>
                 </a:uFill>
                 <a:latin typeface="Corbel"/>
+                <a:ea typeface="DejaVu Sans"/>
               </a:rPr>
               <a:t>Sort by product name, date added, and expiration date</a:t>
             </a:r>
@@ -6502,7 +6880,7 @@
             </a:endParaRPr>
           </a:p>
           <a:p>
-            <a:pPr marL="182880" indent="-182160">
+            <a:pPr marL="182880" indent="-181800">
               <a:lnSpc>
                 <a:spcPct val="150000"/>
               </a:lnSpc>
@@ -6523,6 +6901,7 @@
                   </a:solidFill>
                 </a:uFill>
                 <a:latin typeface="Corbel"/>
+                <a:ea typeface="DejaVu Sans"/>
               </a:rPr>
               <a:t>Database Helper</a:t>
             </a:r>
@@ -6539,7 +6918,7 @@
             </a:endParaRPr>
           </a:p>
           <a:p>
-            <a:pPr lvl="2" marL="648000" indent="-216000">
+            <a:pPr lvl="2" marL="648000" indent="-215640">
               <a:lnSpc>
                 <a:spcPct val="150000"/>
               </a:lnSpc>
@@ -6561,46 +6940,9 @@
                   </a:solidFill>
                 </a:uFill>
                 <a:latin typeface="Corbel"/>
-              </a:rPr>
-              <a:t>Manages insertions, deletions, and queries for a SQLite database </a:t>
-            </a:r>
-            <a:endParaRPr b="0" lang="en-US" sz="1800" spc="-1" strike="noStrike">
-              <a:solidFill>
-                <a:srgbClr val="000000"/>
-              </a:solidFill>
-              <a:uFill>
-                <a:solidFill>
-                  <a:srgbClr val="ffffff"/>
-                </a:solidFill>
-              </a:uFill>
-              <a:latin typeface="Arial"/>
-            </a:endParaRPr>
-          </a:p>
-          <a:p>
-            <a:pPr lvl="1" marL="432000" indent="-216000">
-              <a:lnSpc>
-                <a:spcPct val="150000"/>
-              </a:lnSpc>
-              <a:buClr>
-                <a:srgbClr val="000000"/>
-              </a:buClr>
-              <a:buSzPct val="45000"/>
-              <a:buFont typeface="Wingdings" charset="2"/>
-              <a:buChar char=""/>
-            </a:pPr>
-            <a:r>
-              <a:rPr b="0" lang="en-US" sz="2000" spc="-1" strike="noStrike">
-                <a:solidFill>
-                  <a:srgbClr val="595959"/>
-                </a:solidFill>
-                <a:uFill>
-                  <a:solidFill>
-                    <a:srgbClr val="ffffff"/>
-                  </a:solidFill>
-                </a:uFill>
-                <a:latin typeface="Corbel"/>
-              </a:rPr>
-              <a:t> </a:t>
+                <a:ea typeface="DejaVu Sans"/>
+              </a:rPr>
+              <a:t>Manages insertions, deletions, and queries for a SQLite database  </a:t>
             </a:r>
             <a:endParaRPr b="0" lang="en-US" sz="1800" spc="-1" strike="noStrike">
               <a:solidFill>
@@ -6674,7 +7016,7 @@
         <p:spPr>
           <a:xfrm>
             <a:off x="253080" y="1123920"/>
-            <a:ext cx="2946600" cy="4600440"/>
+            <a:ext cx="2946240" cy="4600080"/>
           </a:xfrm>
           <a:prstGeom prst="rect">
             <a:avLst/>
@@ -6694,7 +7036,7 @@
           <a:bodyPr lIns="90000" rIns="90000" tIns="45000" bIns="45000" anchor="ctr"/>
           <a:p>
             <a:r>
-              <a:rPr b="0" lang="en-US" sz="3600" spc="-55" strike="noStrike">
+              <a:rPr b="0" lang="en-US" sz="3600" spc="-52" strike="noStrike">
                 <a:solidFill>
                   <a:srgbClr val="ffffff"/>
                 </a:solidFill>
@@ -6704,8 +7046,9 @@
                   </a:solidFill>
                 </a:uFill>
                 <a:latin typeface="Corbel"/>
-              </a:rPr>
-              <a:t>Member Tasks:</a:t>
+                <a:ea typeface="DejaVu Sans"/>
+              </a:rPr>
+              <a:t>Code</a:t>
             </a:r>
             <a:endParaRPr b="0" lang="en-US" sz="1800" spc="-1" strike="noStrike">
               <a:solidFill>
@@ -6720,26 +7063,8 @@
             </a:endParaRPr>
           </a:p>
           <a:p>
-            <a:endParaRPr b="0" lang="en-US" sz="1800" spc="-1" strike="noStrike">
-              <a:solidFill>
-                <a:srgbClr val="000000"/>
-              </a:solidFill>
-              <a:uFill>
-                <a:solidFill>
-                  <a:srgbClr val="ffffff"/>
-                </a:solidFill>
-              </a:uFill>
-              <a:latin typeface="Arial"/>
-            </a:endParaRPr>
-          </a:p>
-          <a:p>
-            <a:pPr>
-              <a:lnSpc>
-                <a:spcPct val="90000"/>
-              </a:lnSpc>
-            </a:pPr>
-            <a:r>
-              <a:rPr b="0" lang="en-US" sz="3600" spc="-55" strike="noStrike">
+            <a:r>
+              <a:rPr b="0" lang="en-US" sz="3600" spc="-52" strike="noStrike">
                 <a:solidFill>
                   <a:srgbClr val="ffffff"/>
                 </a:solidFill>
@@ -6749,8 +7074,9 @@
                   </a:solidFill>
                 </a:uFill>
                 <a:latin typeface="Corbel"/>
-              </a:rPr>
-              <a:t>John</a:t>
+                <a:ea typeface="DejaVu Sans"/>
+              </a:rPr>
+              <a:t>Diagram</a:t>
             </a:r>
             <a:endParaRPr b="0" lang="en-US" sz="1800" spc="-1" strike="noStrike">
               <a:solidFill>
@@ -6774,8 +7100,8 @@
         </p:nvSpPr>
         <p:spPr>
           <a:xfrm>
-            <a:off x="3869280" y="864000"/>
-            <a:ext cx="7314480" cy="5119920"/>
+            <a:off x="3932640" y="1006560"/>
+            <a:ext cx="7314120" cy="5119560"/>
           </a:xfrm>
           <a:prstGeom prst="rect">
             <a:avLst/>
@@ -6794,7 +7120,7 @@
         <p:txBody>
           <a:bodyPr lIns="90000" rIns="90000" tIns="45000" bIns="45000" anchor="ctr"/>
           <a:p>
-            <a:pPr marL="182880" indent="-182160">
+            <a:pPr marL="182880" indent="-181800">
               <a:lnSpc>
                 <a:spcPct val="150000"/>
               </a:lnSpc>
@@ -6815,8 +7141,9 @@
                   </a:solidFill>
                 </a:uFill>
                 <a:latin typeface="Corbel"/>
-              </a:rPr>
-              <a:t>Github management and weekly build</a:t>
+                <a:ea typeface="DejaVu Sans"/>
+              </a:rPr>
+              <a:t>  </a:t>
             </a:r>
             <a:endParaRPr b="0" lang="en-US" sz="1800" spc="-1" strike="noStrike">
               <a:solidFill>
@@ -6830,30 +7157,52 @@
               <a:latin typeface="Arial"/>
             </a:endParaRPr>
           </a:p>
-          <a:p>
-            <a:pPr marL="182880" indent="-182160">
-              <a:lnSpc>
-                <a:spcPct val="150000"/>
-              </a:lnSpc>
-              <a:buClr>
-                <a:srgbClr val="40bad2"/>
-              </a:buClr>
-              <a:buFont typeface="Wingdings 2" charset="2"/>
-              <a:buChar char=""/>
-            </a:pPr>
-            <a:r>
-              <a:rPr b="0" lang="en-US" sz="2000" spc="-1" strike="noStrike">
-                <a:solidFill>
-                  <a:srgbClr val="595959"/>
-                </a:solidFill>
-                <a:uFill>
-                  <a:solidFill>
-                    <a:srgbClr val="ffffff"/>
-                  </a:solidFill>
-                </a:uFill>
-                <a:latin typeface="Corbel"/>
-              </a:rPr>
-              <a:t> </a:t>
+        </p:txBody>
+      </p:sp>
+      <p:sp>
+        <p:nvSpPr>
+          <p:cNvPr id="95" name="CustomShape 3"/>
+          <p:cNvSpPr/>
+          <p:nvPr/>
+        </p:nvSpPr>
+        <p:spPr>
+          <a:xfrm>
+            <a:off x="3840480" y="2194560"/>
+            <a:ext cx="2377440" cy="822960"/>
+          </a:xfrm>
+          <a:prstGeom prst="rect">
+            <a:avLst/>
+          </a:prstGeom>
+          <a:noFill/>
+          <a:ln>
+            <a:solidFill>
+              <a:srgbClr val="000000"/>
+            </a:solidFill>
+          </a:ln>
+        </p:spPr>
+        <p:style>
+          <a:lnRef idx="0"/>
+          <a:fillRef idx="0"/>
+          <a:effectRef idx="0"/>
+          <a:fontRef idx="minor"/>
+        </p:style>
+        <p:txBody>
+          <a:bodyPr wrap="none" lIns="90000" rIns="90000" tIns="45000" bIns="45000" anchor="ctr"/>
+          <a:p>
+            <a:pPr algn="ctr"/>
+            <a:r>
+              <a:rPr b="0" lang="en-US" sz="1800" spc="-1" strike="noStrike">
+                <a:solidFill>
+                  <a:srgbClr val="000000"/>
+                </a:solidFill>
+                <a:uFill>
+                  <a:solidFill>
+                    <a:srgbClr val="ffffff"/>
+                  </a:solidFill>
+                </a:uFill>
+                <a:latin typeface="Arial"/>
+              </a:rPr>
+              <a:t>Camera Image</a:t>
             </a:r>
             <a:endParaRPr b="0" lang="en-US" sz="1800" spc="-1" strike="noStrike">
               <a:solidFill>
@@ -6867,30 +7216,52 @@
               <a:latin typeface="Arial"/>
             </a:endParaRPr>
           </a:p>
-          <a:p>
-            <a:pPr marL="182880" indent="-182160">
-              <a:lnSpc>
-                <a:spcPct val="100000"/>
-              </a:lnSpc>
-              <a:buClr>
-                <a:srgbClr val="40bad2"/>
-              </a:buClr>
-              <a:buFont typeface="Wingdings 2" charset="2"/>
-              <a:buChar char=""/>
-            </a:pPr>
-            <a:r>
-              <a:rPr b="0" lang="en-US" sz="2000" spc="-1" strike="noStrike">
-                <a:solidFill>
-                  <a:srgbClr val="595959"/>
-                </a:solidFill>
-                <a:uFill>
-                  <a:solidFill>
-                    <a:srgbClr val="ffffff"/>
-                  </a:solidFill>
-                </a:uFill>
-                <a:latin typeface="Corbel"/>
-              </a:rPr>
-              <a:t>Implement a backend to process barcode information </a:t>
+        </p:txBody>
+      </p:sp>
+      <p:sp>
+        <p:nvSpPr>
+          <p:cNvPr id="96" name="CustomShape 4"/>
+          <p:cNvSpPr/>
+          <p:nvPr/>
+        </p:nvSpPr>
+        <p:spPr>
+          <a:xfrm>
+            <a:off x="3840480" y="3931920"/>
+            <a:ext cx="2377440" cy="2011680"/>
+          </a:xfrm>
+          <a:prstGeom prst="rect">
+            <a:avLst/>
+          </a:prstGeom>
+          <a:noFill/>
+          <a:ln>
+            <a:solidFill>
+              <a:srgbClr val="000000"/>
+            </a:solidFill>
+          </a:ln>
+        </p:spPr>
+        <p:style>
+          <a:lnRef idx="0"/>
+          <a:fillRef idx="0"/>
+          <a:effectRef idx="0"/>
+          <a:fontRef idx="minor"/>
+        </p:style>
+        <p:txBody>
+          <a:bodyPr wrap="none" lIns="90000" rIns="90000" tIns="45000" bIns="45000" anchor="ctr"/>
+          <a:p>
+            <a:pPr algn="ctr"/>
+            <a:r>
+              <a:rPr b="0" lang="en-US" sz="1800" spc="-1" strike="noStrike">
+                <a:solidFill>
+                  <a:srgbClr val="000000"/>
+                </a:solidFill>
+                <a:uFill>
+                  <a:solidFill>
+                    <a:srgbClr val="ffffff"/>
+                  </a:solidFill>
+                </a:uFill>
+                <a:latin typeface="Arial"/>
+              </a:rPr>
+              <a:t>Database</a:t>
             </a:r>
             <a:endParaRPr b="0" lang="en-US" sz="1800" spc="-1" strike="noStrike">
               <a:solidFill>
@@ -6904,30 +7275,52 @@
               <a:latin typeface="Arial"/>
             </a:endParaRPr>
           </a:p>
-          <a:p>
-            <a:pPr marL="182880" indent="-182160">
-              <a:lnSpc>
-                <a:spcPct val="150000"/>
-              </a:lnSpc>
-              <a:buClr>
-                <a:srgbClr val="40bad2"/>
-              </a:buClr>
-              <a:buFont typeface="Wingdings 2" charset="2"/>
-              <a:buChar char=""/>
-            </a:pPr>
-            <a:r>
-              <a:rPr b="0" lang="en-US" sz="2000" spc="-1" strike="noStrike">
-                <a:solidFill>
-                  <a:srgbClr val="595959"/>
-                </a:solidFill>
-                <a:uFill>
-                  <a:solidFill>
-                    <a:srgbClr val="ffffff"/>
-                  </a:solidFill>
-                </a:uFill>
-                <a:latin typeface="Corbel"/>
-              </a:rPr>
-              <a:t>Class Assignments:</a:t>
+        </p:txBody>
+      </p:sp>
+      <p:sp>
+        <p:nvSpPr>
+          <p:cNvPr id="97" name="CustomShape 5"/>
+          <p:cNvSpPr/>
+          <p:nvPr/>
+        </p:nvSpPr>
+        <p:spPr>
+          <a:xfrm>
+            <a:off x="8595360" y="1188720"/>
+            <a:ext cx="1828800" cy="457200"/>
+          </a:xfrm>
+          <a:prstGeom prst="rect">
+            <a:avLst/>
+          </a:prstGeom>
+          <a:noFill/>
+          <a:ln>
+            <a:solidFill>
+              <a:srgbClr val="000000"/>
+            </a:solidFill>
+          </a:ln>
+        </p:spPr>
+        <p:style>
+          <a:lnRef idx="0"/>
+          <a:fillRef idx="0"/>
+          <a:effectRef idx="0"/>
+          <a:fontRef idx="minor"/>
+        </p:style>
+        <p:txBody>
+          <a:bodyPr wrap="none" lIns="90000" rIns="90000" tIns="45000" bIns="45000" anchor="ctr"/>
+          <a:p>
+            <a:pPr algn="ctr"/>
+            <a:r>
+              <a:rPr b="0" lang="en-US" sz="1800" spc="-1" strike="noStrike">
+                <a:solidFill>
+                  <a:srgbClr val="000000"/>
+                </a:solidFill>
+                <a:uFill>
+                  <a:solidFill>
+                    <a:srgbClr val="ffffff"/>
+                  </a:solidFill>
+                </a:uFill>
+                <a:latin typeface="Arial"/>
+              </a:rPr>
+              <a:t>Product Name</a:t>
             </a:r>
             <a:endParaRPr b="0" lang="en-US" sz="1800" spc="-1" strike="noStrike">
               <a:solidFill>
@@ -6941,30 +7334,52 @@
               <a:latin typeface="Arial"/>
             </a:endParaRPr>
           </a:p>
-          <a:p>
-            <a:pPr lvl="1" marL="685800" indent="-182160">
-              <a:lnSpc>
-                <a:spcPct val="150000"/>
-              </a:lnSpc>
-              <a:buClr>
-                <a:srgbClr val="40bad2"/>
-              </a:buClr>
-              <a:buFont typeface="Wingdings 2" charset="2"/>
-              <a:buChar char=""/>
-            </a:pPr>
+        </p:txBody>
+      </p:sp>
+      <p:sp>
+        <p:nvSpPr>
+          <p:cNvPr id="98" name="CustomShape 6"/>
+          <p:cNvSpPr/>
+          <p:nvPr/>
+        </p:nvSpPr>
+        <p:spPr>
+          <a:xfrm>
+            <a:off x="7315200" y="2377440"/>
+            <a:ext cx="1828800" cy="457200"/>
+          </a:xfrm>
+          <a:prstGeom prst="rect">
+            <a:avLst/>
+          </a:prstGeom>
+          <a:noFill/>
+          <a:ln>
+            <a:solidFill>
+              <a:srgbClr val="000000"/>
+            </a:solidFill>
+          </a:ln>
+        </p:spPr>
+        <p:style>
+          <a:lnRef idx="0"/>
+          <a:fillRef idx="0"/>
+          <a:effectRef idx="0"/>
+          <a:fontRef idx="minor"/>
+        </p:style>
+        <p:txBody>
+          <a:bodyPr wrap="none" lIns="90000" rIns="90000" tIns="45000" bIns="45000" anchor="ctr"/>
+          <a:p>
+            <a:pPr algn="ctr"/>
             <a:r>
               <a:rPr b="0" lang="en-US" sz="1800" spc="-1" strike="noStrike">
                 <a:solidFill>
-                  <a:srgbClr val="595959"/>
-                </a:solidFill>
-                <a:uFill>
-                  <a:solidFill>
-                    <a:srgbClr val="ffffff"/>
-                  </a:solidFill>
-                </a:uFill>
-                <a:latin typeface="Corbel"/>
-              </a:rPr>
-              <a:t>NetworkUtils</a:t>
+                  <a:srgbClr val="000000"/>
+                </a:solidFill>
+                <a:uFill>
+                  <a:solidFill>
+                    <a:srgbClr val="ffffff"/>
+                  </a:solidFill>
+                </a:uFill>
+                <a:latin typeface="Arial"/>
+              </a:rPr>
+              <a:t>ItemType</a:t>
             </a:r>
             <a:endParaRPr b="0" lang="en-US" sz="1800" spc="-1" strike="noStrike">
               <a:solidFill>
@@ -6978,30 +7393,52 @@
               <a:latin typeface="Arial"/>
             </a:endParaRPr>
           </a:p>
-          <a:p>
-            <a:pPr lvl="1" marL="685800" indent="-182160">
-              <a:lnSpc>
-                <a:spcPct val="150000"/>
-              </a:lnSpc>
-              <a:buClr>
-                <a:srgbClr val="40bad2"/>
-              </a:buClr>
-              <a:buFont typeface="Wingdings 2" charset="2"/>
-              <a:buChar char=""/>
-            </a:pPr>
+        </p:txBody>
+      </p:sp>
+      <p:sp>
+        <p:nvSpPr>
+          <p:cNvPr id="99" name="CustomShape 7"/>
+          <p:cNvSpPr/>
+          <p:nvPr/>
+        </p:nvSpPr>
+        <p:spPr>
+          <a:xfrm>
+            <a:off x="9601200" y="2834640"/>
+            <a:ext cx="1828800" cy="457200"/>
+          </a:xfrm>
+          <a:prstGeom prst="rect">
+            <a:avLst/>
+          </a:prstGeom>
+          <a:noFill/>
+          <a:ln>
+            <a:solidFill>
+              <a:srgbClr val="000000"/>
+            </a:solidFill>
+          </a:ln>
+        </p:spPr>
+        <p:style>
+          <a:lnRef idx="0"/>
+          <a:fillRef idx="0"/>
+          <a:effectRef idx="0"/>
+          <a:fontRef idx="minor"/>
+        </p:style>
+        <p:txBody>
+          <a:bodyPr wrap="none" lIns="90000" rIns="90000" tIns="45000" bIns="45000" anchor="ctr"/>
+          <a:p>
+            <a:pPr algn="ctr"/>
             <a:r>
               <a:rPr b="0" lang="en-US" sz="1800" spc="-1" strike="noStrike">
                 <a:solidFill>
-                  <a:srgbClr val="595959"/>
-                </a:solidFill>
-                <a:uFill>
-                  <a:solidFill>
-                    <a:srgbClr val="ffffff"/>
-                  </a:solidFill>
-                </a:uFill>
-                <a:latin typeface="Corbel"/>
-              </a:rPr>
-              <a:t>UPCItem</a:t>
+                  <a:srgbClr val="000000"/>
+                </a:solidFill>
+                <a:uFill>
+                  <a:solidFill>
+                    <a:srgbClr val="ffffff"/>
+                  </a:solidFill>
+                </a:uFill>
+                <a:latin typeface="Arial"/>
+              </a:rPr>
+              <a:t>Thumbnail</a:t>
             </a:r>
             <a:endParaRPr b="0" lang="en-US" sz="1800" spc="-1" strike="noStrike">
               <a:solidFill>
@@ -7015,30 +7452,52 @@
               <a:latin typeface="Arial"/>
             </a:endParaRPr>
           </a:p>
-          <a:p>
-            <a:pPr lvl="1" marL="685800" indent="-182160">
-              <a:lnSpc>
-                <a:spcPct val="150000"/>
-              </a:lnSpc>
-              <a:buClr>
-                <a:srgbClr val="40bad2"/>
-              </a:buClr>
-              <a:buFont typeface="Wingdings 2" charset="2"/>
-              <a:buChar char=""/>
-            </a:pPr>
+        </p:txBody>
+      </p:sp>
+      <p:sp>
+        <p:nvSpPr>
+          <p:cNvPr id="100" name="CustomShape 8"/>
+          <p:cNvSpPr/>
+          <p:nvPr/>
+        </p:nvSpPr>
+        <p:spPr>
+          <a:xfrm>
+            <a:off x="7315200" y="3291840"/>
+            <a:ext cx="1828800" cy="457200"/>
+          </a:xfrm>
+          <a:prstGeom prst="rect">
+            <a:avLst/>
+          </a:prstGeom>
+          <a:noFill/>
+          <a:ln>
+            <a:solidFill>
+              <a:srgbClr val="000000"/>
+            </a:solidFill>
+          </a:ln>
+        </p:spPr>
+        <p:style>
+          <a:lnRef idx="0"/>
+          <a:fillRef idx="0"/>
+          <a:effectRef idx="0"/>
+          <a:fontRef idx="minor"/>
+        </p:style>
+        <p:txBody>
+          <a:bodyPr wrap="none" lIns="90000" rIns="90000" tIns="45000" bIns="45000" anchor="ctr"/>
+          <a:p>
+            <a:pPr algn="ctr"/>
             <a:r>
               <a:rPr b="0" lang="en-US" sz="1800" spc="-1" strike="noStrike">
                 <a:solidFill>
-                  <a:srgbClr val="595959"/>
-                </a:solidFill>
-                <a:uFill>
-                  <a:solidFill>
-                    <a:srgbClr val="ffffff"/>
-                  </a:solidFill>
-                </a:uFill>
-                <a:latin typeface="Corbel"/>
-              </a:rPr>
-              <a:t>UPCItemLoader</a:t>
+                  <a:srgbClr val="000000"/>
+                </a:solidFill>
+                <a:uFill>
+                  <a:solidFill>
+                    <a:srgbClr val="ffffff"/>
+                  </a:solidFill>
+                </a:uFill>
+                <a:latin typeface="Arial"/>
+              </a:rPr>
+              <a:t>Expiration Date</a:t>
             </a:r>
             <a:endParaRPr b="0" lang="en-US" sz="1800" spc="-1" strike="noStrike">
               <a:solidFill>
@@ -7052,30 +7511,447 @@
               <a:latin typeface="Arial"/>
             </a:endParaRPr>
           </a:p>
-          <a:p>
-            <a:pPr lvl="1" marL="685800" indent="-182160">
-              <a:lnSpc>
-                <a:spcPct val="150000"/>
-              </a:lnSpc>
-              <a:buClr>
-                <a:srgbClr val="40bad2"/>
-              </a:buClr>
-              <a:buFont typeface="Wingdings 2" charset="2"/>
-              <a:buChar char=""/>
-            </a:pPr>
+        </p:txBody>
+      </p:sp>
+      <p:sp>
+        <p:nvSpPr>
+          <p:cNvPr id="101" name="Line 9"/>
+          <p:cNvSpPr/>
+          <p:nvPr/>
+        </p:nvSpPr>
+        <p:spPr>
+          <a:xfrm>
+            <a:off x="10241280" y="1645920"/>
+            <a:ext cx="274320" cy="1188720"/>
+          </a:xfrm>
+          <a:prstGeom prst="line">
+            <a:avLst/>
+          </a:prstGeom>
+          <a:ln>
+            <a:solidFill>
+              <a:srgbClr val="000000"/>
+            </a:solidFill>
+            <a:tailEnd len="med" type="triangle" w="med"/>
+          </a:ln>
+        </p:spPr>
+        <p:style>
+          <a:lnRef idx="0"/>
+          <a:fillRef idx="0"/>
+          <a:effectRef idx="0"/>
+          <a:fontRef idx="minor"/>
+        </p:style>
+      </p:sp>
+      <p:sp>
+        <p:nvSpPr>
+          <p:cNvPr id="102" name="Line 10"/>
+          <p:cNvSpPr/>
+          <p:nvPr/>
+        </p:nvSpPr>
+        <p:spPr>
+          <a:xfrm flipH="1">
+            <a:off x="8229600" y="1645920"/>
+            <a:ext cx="731520" cy="731520"/>
+          </a:xfrm>
+          <a:prstGeom prst="line">
+            <a:avLst/>
+          </a:prstGeom>
+          <a:ln>
+            <a:solidFill>
+              <a:srgbClr val="000000"/>
+            </a:solidFill>
+            <a:tailEnd len="med" type="triangle" w="med"/>
+          </a:ln>
+        </p:spPr>
+        <p:style>
+          <a:lnRef idx="0"/>
+          <a:fillRef idx="0"/>
+          <a:effectRef idx="0"/>
+          <a:fontRef idx="minor"/>
+        </p:style>
+      </p:sp>
+      <p:sp>
+        <p:nvSpPr>
+          <p:cNvPr id="103" name="Line 11"/>
+          <p:cNvSpPr/>
+          <p:nvPr/>
+        </p:nvSpPr>
+        <p:spPr>
+          <a:xfrm>
+            <a:off x="8229600" y="2834640"/>
+            <a:ext cx="0" cy="457200"/>
+          </a:xfrm>
+          <a:prstGeom prst="line">
+            <a:avLst/>
+          </a:prstGeom>
+          <a:ln>
+            <a:solidFill>
+              <a:srgbClr val="000000"/>
+            </a:solidFill>
+            <a:tailEnd len="med" type="triangle" w="med"/>
+          </a:ln>
+        </p:spPr>
+        <p:style>
+          <a:lnRef idx="0"/>
+          <a:fillRef idx="0"/>
+          <a:effectRef idx="0"/>
+          <a:fontRef idx="minor"/>
+        </p:style>
+      </p:sp>
+      <p:sp>
+        <p:nvSpPr>
+          <p:cNvPr id="104" name="CustomShape 12"/>
+          <p:cNvSpPr/>
+          <p:nvPr/>
+        </p:nvSpPr>
+        <p:spPr>
+          <a:xfrm>
+            <a:off x="9509760" y="1920240"/>
+            <a:ext cx="1828800" cy="457200"/>
+          </a:xfrm>
+          <a:prstGeom prst="rect">
+            <a:avLst/>
+          </a:prstGeom>
+          <a:noFill/>
+          <a:ln>
+            <a:solidFill>
+              <a:srgbClr val="000000"/>
+            </a:solidFill>
+            <a:custDash/>
+          </a:ln>
+        </p:spPr>
+        <p:style>
+          <a:lnRef idx="0"/>
+          <a:fillRef idx="0"/>
+          <a:effectRef idx="0"/>
+          <a:fontRef idx="minor"/>
+        </p:style>
+        <p:txBody>
+          <a:bodyPr wrap="none" lIns="90000" rIns="90000" tIns="45000" bIns="45000" anchor="ctr"/>
+          <a:p>
+            <a:pPr algn="ctr"/>
             <a:r>
               <a:rPr b="0" lang="en-US" sz="1800" spc="-1" strike="noStrike">
                 <a:solidFill>
-                  <a:srgbClr val="595959"/>
-                </a:solidFill>
-                <a:uFill>
-                  <a:solidFill>
-                    <a:srgbClr val="ffffff"/>
-                  </a:solidFill>
-                </a:uFill>
-                <a:latin typeface="Corbel"/>
-              </a:rPr>
-              <a:t>ItemType</a:t>
+                  <a:srgbClr val="000000"/>
+                </a:solidFill>
+                <a:uFill>
+                  <a:solidFill>
+                    <a:srgbClr val="ffffff"/>
+                  </a:solidFill>
+                </a:uFill>
+                <a:latin typeface="Arial"/>
+              </a:rPr>
+              <a:t>Google CSE</a:t>
+            </a:r>
+            <a:endParaRPr b="0" lang="en-US" sz="1800" spc="-1" strike="noStrike">
+              <a:solidFill>
+                <a:srgbClr val="000000"/>
+              </a:solidFill>
+              <a:uFill>
+                <a:solidFill>
+                  <a:srgbClr val="ffffff"/>
+                </a:solidFill>
+              </a:uFill>
+              <a:latin typeface="Arial"/>
+            </a:endParaRPr>
+          </a:p>
+        </p:txBody>
+      </p:sp>
+      <p:sp>
+        <p:nvSpPr>
+          <p:cNvPr id="105" name="Line 13"/>
+          <p:cNvSpPr/>
+          <p:nvPr/>
+        </p:nvSpPr>
+        <p:spPr>
+          <a:xfrm>
+            <a:off x="5120640" y="1280160"/>
+            <a:ext cx="1828800" cy="0"/>
+          </a:xfrm>
+          <a:prstGeom prst="line">
+            <a:avLst/>
+          </a:prstGeom>
+          <a:ln>
+            <a:solidFill>
+              <a:srgbClr val="000000"/>
+            </a:solidFill>
+            <a:tailEnd len="med" type="triangle" w="med"/>
+          </a:ln>
+        </p:spPr>
+        <p:style>
+          <a:lnRef idx="0"/>
+          <a:fillRef idx="0"/>
+          <a:effectRef idx="0"/>
+          <a:fontRef idx="minor"/>
+        </p:style>
+      </p:sp>
+      <p:sp>
+        <p:nvSpPr>
+          <p:cNvPr id="106" name="CustomShape 14"/>
+          <p:cNvSpPr/>
+          <p:nvPr/>
+        </p:nvSpPr>
+        <p:spPr>
+          <a:xfrm>
+            <a:off x="4206240" y="1463040"/>
+            <a:ext cx="1828800" cy="457200"/>
+          </a:xfrm>
+          <a:prstGeom prst="rect">
+            <a:avLst/>
+          </a:prstGeom>
+          <a:solidFill>
+            <a:srgbClr val="ffffff"/>
+          </a:solidFill>
+          <a:ln>
+            <a:solidFill>
+              <a:srgbClr val="000000"/>
+            </a:solidFill>
+            <a:custDash/>
+          </a:ln>
+        </p:spPr>
+        <p:style>
+          <a:lnRef idx="0"/>
+          <a:fillRef idx="0"/>
+          <a:effectRef idx="0"/>
+          <a:fontRef idx="minor"/>
+        </p:style>
+        <p:txBody>
+          <a:bodyPr wrap="none" lIns="90000" rIns="90000" tIns="45000" bIns="45000" anchor="ctr"/>
+          <a:p>
+            <a:pPr algn="ctr"/>
+            <a:r>
+              <a:rPr b="0" lang="en-US" sz="1800" spc="-1" strike="noStrike">
+                <a:solidFill>
+                  <a:srgbClr val="000000"/>
+                </a:solidFill>
+                <a:uFill>
+                  <a:solidFill>
+                    <a:srgbClr val="ffffff"/>
+                  </a:solidFill>
+                </a:uFill>
+                <a:latin typeface="Arial"/>
+              </a:rPr>
+              <a:t>UPCDatabase</a:t>
+            </a:r>
+            <a:endParaRPr b="0" lang="en-US" sz="1800" spc="-1" strike="noStrike">
+              <a:solidFill>
+                <a:srgbClr val="000000"/>
+              </a:solidFill>
+              <a:uFill>
+                <a:solidFill>
+                  <a:srgbClr val="ffffff"/>
+                </a:solidFill>
+              </a:uFill>
+              <a:latin typeface="Arial"/>
+            </a:endParaRPr>
+          </a:p>
+        </p:txBody>
+      </p:sp>
+      <p:sp>
+        <p:nvSpPr>
+          <p:cNvPr id="107" name="Line 15"/>
+          <p:cNvSpPr/>
+          <p:nvPr/>
+        </p:nvSpPr>
+        <p:spPr>
+          <a:xfrm>
+            <a:off x="5120640" y="1280160"/>
+            <a:ext cx="0" cy="914400"/>
+          </a:xfrm>
+          <a:prstGeom prst="line">
+            <a:avLst/>
+          </a:prstGeom>
+          <a:ln>
+            <a:solidFill>
+              <a:srgbClr val="000000"/>
+            </a:solidFill>
+          </a:ln>
+        </p:spPr>
+        <p:style>
+          <a:lnRef idx="0"/>
+          <a:fillRef idx="0"/>
+          <a:effectRef idx="0"/>
+          <a:fontRef idx="minor"/>
+        </p:style>
+      </p:sp>
+      <p:sp>
+        <p:nvSpPr>
+          <p:cNvPr id="108" name="CustomShape 16"/>
+          <p:cNvSpPr/>
+          <p:nvPr/>
+        </p:nvSpPr>
+        <p:spPr>
+          <a:xfrm>
+            <a:off x="6949440" y="548640"/>
+            <a:ext cx="4754880" cy="3383280"/>
+          </a:xfrm>
+          <a:prstGeom prst="rect">
+            <a:avLst/>
+          </a:prstGeom>
+          <a:noFill/>
+          <a:ln>
+            <a:solidFill>
+              <a:srgbClr val="000000"/>
+            </a:solidFill>
+          </a:ln>
+        </p:spPr>
+        <p:style>
+          <a:lnRef idx="0"/>
+          <a:fillRef idx="0"/>
+          <a:effectRef idx="0"/>
+          <a:fontRef idx="minor"/>
+        </p:style>
+      </p:sp>
+      <p:sp>
+        <p:nvSpPr>
+          <p:cNvPr id="109" name="TextShape 17"/>
+          <p:cNvSpPr txBox="1"/>
+          <p:nvPr/>
+        </p:nvSpPr>
+        <p:spPr>
+          <a:xfrm>
+            <a:off x="8778240" y="568080"/>
+            <a:ext cx="1371600" cy="346320"/>
+          </a:xfrm>
+          <a:prstGeom prst="rect">
+            <a:avLst/>
+          </a:prstGeom>
+          <a:noFill/>
+          <a:ln>
+            <a:noFill/>
+          </a:ln>
+        </p:spPr>
+        <p:txBody>
+          <a:bodyPr lIns="90000" rIns="90000" tIns="45000" bIns="45000"/>
+          <a:p>
+            <a:r>
+              <a:rPr b="0" lang="en-US" sz="1800" spc="-1" strike="noStrike">
+                <a:solidFill>
+                  <a:srgbClr val="000000"/>
+                </a:solidFill>
+                <a:uFill>
+                  <a:solidFill>
+                    <a:srgbClr val="ffffff"/>
+                  </a:solidFill>
+                </a:uFill>
+                <a:latin typeface="Arial"/>
+              </a:rPr>
+              <a:t>UpcItem</a:t>
+            </a:r>
+            <a:endParaRPr b="0" lang="en-US" sz="1800" spc="-1" strike="noStrike">
+              <a:solidFill>
+                <a:srgbClr val="000000"/>
+              </a:solidFill>
+              <a:uFill>
+                <a:solidFill>
+                  <a:srgbClr val="ffffff"/>
+                </a:solidFill>
+              </a:uFill>
+              <a:latin typeface="Arial"/>
+            </a:endParaRPr>
+          </a:p>
+        </p:txBody>
+      </p:sp>
+      <p:sp>
+        <p:nvSpPr>
+          <p:cNvPr id="110" name="Line 18"/>
+          <p:cNvSpPr/>
+          <p:nvPr/>
+        </p:nvSpPr>
+        <p:spPr>
+          <a:xfrm flipH="1">
+            <a:off x="6217920" y="5486400"/>
+            <a:ext cx="3200400" cy="0"/>
+          </a:xfrm>
+          <a:prstGeom prst="line">
+            <a:avLst/>
+          </a:prstGeom>
+          <a:ln>
+            <a:solidFill>
+              <a:srgbClr val="000000"/>
+            </a:solidFill>
+            <a:tailEnd len="med" type="triangle" w="med"/>
+          </a:ln>
+        </p:spPr>
+        <p:style>
+          <a:lnRef idx="0"/>
+          <a:fillRef idx="0"/>
+          <a:effectRef idx="0"/>
+          <a:fontRef idx="minor"/>
+        </p:style>
+      </p:sp>
+      <p:sp>
+        <p:nvSpPr>
+          <p:cNvPr id="111" name="Line 19"/>
+          <p:cNvSpPr/>
+          <p:nvPr/>
+        </p:nvSpPr>
+        <p:spPr>
+          <a:xfrm flipV="1">
+            <a:off x="9418320" y="3931920"/>
+            <a:ext cx="0" cy="1554480"/>
+          </a:xfrm>
+          <a:prstGeom prst="line">
+            <a:avLst/>
+          </a:prstGeom>
+          <a:ln>
+            <a:solidFill>
+              <a:srgbClr val="000000"/>
+            </a:solidFill>
+          </a:ln>
+        </p:spPr>
+        <p:style>
+          <a:lnRef idx="0"/>
+          <a:fillRef idx="0"/>
+          <a:effectRef idx="0"/>
+          <a:fontRef idx="minor"/>
+        </p:style>
+      </p:sp>
+      <p:sp>
+        <p:nvSpPr>
+          <p:cNvPr id="112" name="CustomShape 20"/>
+          <p:cNvSpPr/>
+          <p:nvPr/>
+        </p:nvSpPr>
+        <p:spPr>
+          <a:xfrm>
+            <a:off x="8503920" y="4480560"/>
+            <a:ext cx="1828800" cy="457200"/>
+          </a:xfrm>
+          <a:prstGeom prst="rect">
+            <a:avLst/>
+          </a:prstGeom>
+          <a:noFill/>
+          <a:ln>
+            <a:solidFill>
+              <a:srgbClr val="000000"/>
+            </a:solidFill>
+            <a:custDash/>
+          </a:ln>
+        </p:spPr>
+        <p:style>
+          <a:lnRef idx="0"/>
+          <a:fillRef idx="0"/>
+          <a:effectRef idx="0"/>
+          <a:fontRef idx="minor"/>
+        </p:style>
+        <p:txBody>
+          <a:bodyPr wrap="none" lIns="90000" rIns="90000" tIns="45000" bIns="45000" anchor="ctr"/>
+          <a:p>
+            <a:pPr algn="ctr"/>
+            <a:r>
+              <a:rPr b="0" lang="en-US" sz="1800" spc="-1" strike="noStrike">
+                <a:solidFill>
+                  <a:srgbClr val="000000"/>
+                </a:solidFill>
+                <a:uFill>
+                  <a:solidFill>
+                    <a:srgbClr val="ffffff"/>
+                  </a:solidFill>
+                </a:uFill>
+                <a:latin typeface="Arial"/>
+              </a:rPr>
+              <a:t>SQLite Database</a:t>
             </a:r>
             <a:endParaRPr b="0" lang="en-US" sz="1800" spc="-1" strike="noStrike">
               <a:solidFill>
@@ -7142,14 +8018,14 @@
       </p:grpSpPr>
       <p:sp>
         <p:nvSpPr>
-          <p:cNvPr id="95" name="CustomShape 1"/>
+          <p:cNvPr id="113" name="CustomShape 1"/>
           <p:cNvSpPr/>
           <p:nvPr/>
         </p:nvSpPr>
         <p:spPr>
           <a:xfrm>
-            <a:off x="239760" y="1123920"/>
-            <a:ext cx="2946600" cy="4600440"/>
+            <a:off x="253080" y="1123920"/>
+            <a:ext cx="2946240" cy="4600080"/>
           </a:xfrm>
           <a:prstGeom prst="rect">
             <a:avLst/>
@@ -7169,7 +8045,7 @@
           <a:bodyPr lIns="90000" rIns="90000" tIns="45000" bIns="45000" anchor="ctr"/>
           <a:p>
             <a:r>
-              <a:rPr b="0" lang="en-US" sz="3600" spc="-55" strike="noStrike">
+              <a:rPr b="0" lang="en-US" sz="3600" spc="-52" strike="noStrike">
                 <a:solidFill>
                   <a:srgbClr val="ffffff"/>
                 </a:solidFill>
@@ -7179,6 +8055,7 @@
                   </a:solidFill>
                 </a:uFill>
                 <a:latin typeface="Corbel"/>
+                <a:ea typeface="DejaVu Sans"/>
               </a:rPr>
               <a:t>Member Tasks:</a:t>
             </a:r>
@@ -7214,7 +8091,7 @@
               </a:lnSpc>
             </a:pPr>
             <a:r>
-              <a:rPr b="0" lang="en-US" sz="3600" spc="-55" strike="noStrike">
+              <a:rPr b="0" lang="en-US" sz="3600" spc="-52" strike="noStrike">
                 <a:solidFill>
                   <a:srgbClr val="ffffff"/>
                 </a:solidFill>
@@ -7224,8 +8101,9 @@
                   </a:solidFill>
                 </a:uFill>
                 <a:latin typeface="Corbel"/>
-              </a:rPr>
-              <a:t>Alex</a:t>
+                <a:ea typeface="DejaVu Sans"/>
+              </a:rPr>
+              <a:t>John</a:t>
             </a:r>
             <a:endParaRPr b="0" lang="en-US" sz="1800" spc="-1" strike="noStrike">
               <a:solidFill>
@@ -7243,14 +8121,14 @@
       </p:sp>
       <p:sp>
         <p:nvSpPr>
-          <p:cNvPr id="96" name="CustomShape 2"/>
+          <p:cNvPr id="114" name="CustomShape 2"/>
           <p:cNvSpPr/>
           <p:nvPr/>
         </p:nvSpPr>
         <p:spPr>
           <a:xfrm>
             <a:off x="3869280" y="864000"/>
-            <a:ext cx="7314480" cy="5119920"/>
+            <a:ext cx="7314120" cy="5119560"/>
           </a:xfrm>
           <a:prstGeom prst="rect">
             <a:avLst/>
@@ -7269,7 +8147,7 @@
         <p:txBody>
           <a:bodyPr lIns="90000" rIns="90000" tIns="45000" bIns="45000" anchor="ctr"/>
           <a:p>
-            <a:pPr marL="182880" indent="-182160">
+            <a:pPr marL="182880" indent="-181800">
               <a:lnSpc>
                 <a:spcPct val="150000"/>
               </a:lnSpc>
@@ -7290,8 +8168,9 @@
                   </a:solidFill>
                 </a:uFill>
                 <a:latin typeface="Corbel"/>
-              </a:rPr>
-              <a:t>Set up a SQL database to store and access scanned items</a:t>
+                <a:ea typeface="DejaVu Sans"/>
+              </a:rPr>
+              <a:t>Github management and weekly build</a:t>
             </a:r>
             <a:endParaRPr b="0" lang="en-US" sz="1800" spc="-1" strike="noStrike">
               <a:solidFill>
@@ -7306,7 +8185,7 @@
             </a:endParaRPr>
           </a:p>
           <a:p>
-            <a:pPr marL="182880" indent="-182160">
+            <a:pPr marL="182880" indent="-181800">
               <a:lnSpc>
                 <a:spcPct val="150000"/>
               </a:lnSpc>
@@ -7327,8 +8206,9 @@
                   </a:solidFill>
                 </a:uFill>
                 <a:latin typeface="Corbel"/>
-              </a:rPr>
-              <a:t>Create an API structure (directory organization, class hierarchies, etc.)</a:t>
+                <a:ea typeface="DejaVu Sans"/>
+              </a:rPr>
+              <a:t> </a:t>
             </a:r>
             <a:endParaRPr b="0" lang="en-US" sz="1800" spc="-1" strike="noStrike">
               <a:solidFill>
@@ -7343,7 +8223,45 @@
             </a:endParaRPr>
           </a:p>
           <a:p>
-            <a:pPr marL="182880" indent="-182160">
+            <a:pPr marL="182880" indent="-181800">
+              <a:lnSpc>
+                <a:spcPct val="100000"/>
+              </a:lnSpc>
+              <a:buClr>
+                <a:srgbClr val="40bad2"/>
+              </a:buClr>
+              <a:buFont typeface="Wingdings 2" charset="2"/>
+              <a:buChar char=""/>
+            </a:pPr>
+            <a:r>
+              <a:rPr b="0" lang="en-US" sz="2000" spc="-1" strike="noStrike">
+                <a:solidFill>
+                  <a:srgbClr val="595959"/>
+                </a:solidFill>
+                <a:uFill>
+                  <a:solidFill>
+                    <a:srgbClr val="ffffff"/>
+                  </a:solidFill>
+                </a:uFill>
+                <a:latin typeface="Corbel"/>
+                <a:ea typeface="DejaVu Sans"/>
+              </a:rPr>
+              <a:t>Implement a backend to process barcode information </a:t>
+            </a:r>
+            <a:endParaRPr b="0" lang="en-US" sz="1800" spc="-1" strike="noStrike">
+              <a:solidFill>
+                <a:srgbClr val="000000"/>
+              </a:solidFill>
+              <a:uFill>
+                <a:solidFill>
+                  <a:srgbClr val="ffffff"/>
+                </a:solidFill>
+              </a:uFill>
+              <a:latin typeface="Arial"/>
+            </a:endParaRPr>
+          </a:p>
+          <a:p>
+            <a:pPr marL="182880" indent="-181800">
               <a:lnSpc>
                 <a:spcPct val="150000"/>
               </a:lnSpc>
@@ -7364,6 +8282,7 @@
                   </a:solidFill>
                 </a:uFill>
                 <a:latin typeface="Corbel"/>
+                <a:ea typeface="DejaVu Sans"/>
               </a:rPr>
               <a:t>Class Assignments:</a:t>
             </a:r>
@@ -7380,7 +8299,7 @@
             </a:endParaRPr>
           </a:p>
           <a:p>
-            <a:pPr lvl="1" marL="685800" indent="-182160">
+            <a:pPr lvl="1" marL="685800" indent="-181800">
               <a:lnSpc>
                 <a:spcPct val="150000"/>
               </a:lnSpc>
@@ -7401,8 +8320,9 @@
                   </a:solidFill>
                 </a:uFill>
                 <a:latin typeface="Corbel"/>
-              </a:rPr>
-              <a:t>DBHelper</a:t>
+                <a:ea typeface="DejaVu Sans"/>
+              </a:rPr>
+              <a:t>NetworkUtils</a:t>
             </a:r>
             <a:endParaRPr b="0" lang="en-US" sz="1800" spc="-1" strike="noStrike">
               <a:solidFill>
@@ -7417,7 +8337,7 @@
             </a:endParaRPr>
           </a:p>
           <a:p>
-            <a:pPr lvl="1" marL="685800" indent="-182160">
+            <a:pPr lvl="1" marL="685800" indent="-181800">
               <a:lnSpc>
                 <a:spcPct val="150000"/>
               </a:lnSpc>
@@ -7438,8 +8358,85 @@
                   </a:solidFill>
                 </a:uFill>
                 <a:latin typeface="Corbel"/>
-              </a:rPr>
-              <a:t>ResultsActivity</a:t>
+                <a:ea typeface="DejaVu Sans"/>
+              </a:rPr>
+              <a:t>UPCItem</a:t>
+            </a:r>
+            <a:endParaRPr b="0" lang="en-US" sz="1800" spc="-1" strike="noStrike">
+              <a:solidFill>
+                <a:srgbClr val="000000"/>
+              </a:solidFill>
+              <a:uFill>
+                <a:solidFill>
+                  <a:srgbClr val="ffffff"/>
+                </a:solidFill>
+              </a:uFill>
+              <a:latin typeface="Arial"/>
+            </a:endParaRPr>
+          </a:p>
+          <a:p>
+            <a:pPr lvl="1" marL="685800" indent="-181800">
+              <a:lnSpc>
+                <a:spcPct val="150000"/>
+              </a:lnSpc>
+              <a:buClr>
+                <a:srgbClr val="40bad2"/>
+              </a:buClr>
+              <a:buFont typeface="Wingdings 2" charset="2"/>
+              <a:buChar char=""/>
+            </a:pPr>
+            <a:r>
+              <a:rPr b="0" lang="en-US" sz="1800" spc="-1" strike="noStrike">
+                <a:solidFill>
+                  <a:srgbClr val="595959"/>
+                </a:solidFill>
+                <a:uFill>
+                  <a:solidFill>
+                    <a:srgbClr val="ffffff"/>
+                  </a:solidFill>
+                </a:uFill>
+                <a:latin typeface="Corbel"/>
+                <a:ea typeface="DejaVu Sans"/>
+              </a:rPr>
+              <a:t>UPCItemLoader</a:t>
+            </a:r>
+            <a:endParaRPr b="0" lang="en-US" sz="1800" spc="-1" strike="noStrike">
+              <a:solidFill>
+                <a:srgbClr val="000000"/>
+              </a:solidFill>
+              <a:uFill>
+                <a:solidFill>
+                  <a:srgbClr val="ffffff"/>
+                </a:solidFill>
+              </a:uFill>
+              <a:latin typeface="Arial"/>
+            </a:endParaRPr>
+          </a:p>
+          <a:p>
+            <a:pPr lvl="1" marL="685800" indent="-181800">
+              <a:lnSpc>
+                <a:spcPct val="150000"/>
+              </a:lnSpc>
+              <a:buClr>
+                <a:srgbClr val="40bad2"/>
+              </a:buClr>
+              <a:buFont typeface="Wingdings 2" charset="2"/>
+              <a:buChar char=""/>
+            </a:pPr>
+            <a:r>
+              <a:rPr b="0" lang="en-US" sz="1800" spc="-1" strike="noStrike">
+                <a:solidFill>
+                  <a:srgbClr val="595959"/>
+                </a:solidFill>
+                <a:uFill>
+                  <a:solidFill>
+                    <a:srgbClr val="ffffff"/>
+                  </a:solidFill>
+                </a:uFill>
+                <a:latin typeface="Corbel"/>
+                <a:ea typeface="DejaVu Sans"/>
+              </a:rPr>
+              <a:t>ItemType</a:t>
             </a:r>
             <a:endParaRPr b="0" lang="en-US" sz="1800" spc="-1" strike="noStrike">
               <a:solidFill>

</xml_diff>